<commit_message>
Wrote the three Vs
</commit_message>
<xml_diff>
--- a/Advanced DBMS Presentation.pptx
+++ b/Advanced DBMS Presentation.pptx
@@ -6,6 +6,11 @@
   </p:sldMasterIdLst>
   <p:sldIdLst>
     <p:sldId id="256" r:id="rId2"/>
+    <p:sldId id="257" r:id="rId3"/>
+    <p:sldId id="258" r:id="rId4"/>
+    <p:sldId id="259" r:id="rId5"/>
+    <p:sldId id="260" r:id="rId6"/>
+    <p:sldId id="261" r:id="rId7"/>
   </p:sldIdLst>
   <p:sldSz cx="12192000" cy="6858000"/>
   <p:notesSz cx="6858000" cy="9144000"/>
@@ -104,6 +109,11 @@
       </a:defRPr>
     </a:lvl9pPr>
   </p:defaultTextStyle>
+  <p:extLst>
+    <p:ext uri="{EFAFB233-063F-42B5-8137-9DF3F51BA10A}">
+      <p15:sldGuideLst xmlns:p15="http://schemas.microsoft.com/office/powerpoint/2012/main"/>
+    </p:ext>
+  </p:extLst>
 </p:presentation>
 </file>
 
@@ -3044,6 +3054,656 @@
 </p:sld>
 </file>
 
+<file path=ppt/slides/slide2.xml><?xml version="1.0" encoding="utf-8"?>
+<p:sld xmlns:a="http://schemas.openxmlformats.org/drawingml/2006/main" xmlns:r="http://schemas.openxmlformats.org/officeDocument/2006/relationships" xmlns:p="http://schemas.openxmlformats.org/presentationml/2006/main">
+  <p:cSld>
+    <p:spTree>
+      <p:nvGrpSpPr>
+        <p:cNvPr id="1" name=""/>
+        <p:cNvGrpSpPr/>
+        <p:nvPr/>
+      </p:nvGrpSpPr>
+      <p:grpSpPr>
+        <a:xfrm>
+          <a:off x="0" y="0"/>
+          <a:ext cx="0" cy="0"/>
+          <a:chOff x="0" y="0"/>
+          <a:chExt cx="0" cy="0"/>
+        </a:xfrm>
+      </p:grpSpPr>
+      <p:sp>
+        <p:nvSpPr>
+          <p:cNvPr id="2" name="Title 1"/>
+          <p:cNvSpPr>
+            <a:spLocks noGrp="1"/>
+          </p:cNvSpPr>
+          <p:nvPr>
+            <p:ph type="title"/>
+          </p:nvPr>
+        </p:nvSpPr>
+        <p:spPr>
+          <a:gradFill flip="none" rotWithShape="1">
+            <a:gsLst>
+              <a:gs pos="0">
+                <a:schemeClr val="accent1">
+                  <a:tint val="66000"/>
+                  <a:satMod val="160000"/>
+                </a:schemeClr>
+              </a:gs>
+              <a:gs pos="50000">
+                <a:schemeClr val="accent1">
+                  <a:tint val="44500"/>
+                  <a:satMod val="160000"/>
+                </a:schemeClr>
+              </a:gs>
+              <a:gs pos="100000">
+                <a:schemeClr val="accent1">
+                  <a:tint val="23500"/>
+                  <a:satMod val="160000"/>
+                </a:schemeClr>
+              </a:gs>
+            </a:gsLst>
+            <a:lin ang="5400000" scaled="1"/>
+            <a:tileRect/>
+          </a:gradFill>
+        </p:spPr>
+        <p:txBody>
+          <a:bodyPr/>
+          <a:lstStyle/>
+          <a:p>
+            <a:pPr algn="ctr"/>
+            <a:r>
+              <a:rPr lang="en-US" dirty="0" smtClean="0"/>
+              <a:t>What is Big Data?</a:t>
+            </a:r>
+            <a:endParaRPr lang="en-US" dirty="0"/>
+          </a:p>
+        </p:txBody>
+      </p:sp>
+      <p:sp>
+        <p:nvSpPr>
+          <p:cNvPr id="3" name="Content Placeholder 2"/>
+          <p:cNvSpPr>
+            <a:spLocks noGrp="1"/>
+          </p:cNvSpPr>
+          <p:nvPr>
+            <p:ph idx="1"/>
+          </p:nvPr>
+        </p:nvSpPr>
+        <p:spPr/>
+        <p:txBody>
+          <a:bodyPr>
+            <a:normAutofit/>
+          </a:bodyPr>
+          <a:lstStyle/>
+          <a:p>
+            <a:pPr algn="just">
+              <a:lnSpc>
+                <a:spcPct val="150000"/>
+              </a:lnSpc>
+            </a:pPr>
+            <a:r>
+              <a:rPr lang="en-US" sz="3200" dirty="0" smtClean="0"/>
+              <a:t>Big </a:t>
+            </a:r>
+            <a:r>
+              <a:rPr lang="en-US" sz="3200" dirty="0"/>
+              <a:t>data is a field that treats ways to analyze, systematically extract information from, or otherwise deal with data sets that are too large </a:t>
+            </a:r>
+            <a:r>
+              <a:rPr lang="en-US" sz="3200" dirty="0" smtClean="0"/>
+              <a:t>to </a:t>
+            </a:r>
+            <a:r>
+              <a:rPr lang="en-US" sz="3200" dirty="0"/>
+              <a:t>be dealt with by traditional data-processing application software.</a:t>
+            </a:r>
+          </a:p>
+        </p:txBody>
+      </p:sp>
+    </p:spTree>
+    <p:extLst>
+      <p:ext uri="{BB962C8B-B14F-4D97-AF65-F5344CB8AC3E}">
+        <p14:creationId xmlns:p14="http://schemas.microsoft.com/office/powerpoint/2010/main" val="910449758"/>
+      </p:ext>
+    </p:extLst>
+  </p:cSld>
+  <p:clrMapOvr>
+    <a:masterClrMapping/>
+  </p:clrMapOvr>
+</p:sld>
+</file>
+
+<file path=ppt/slides/slide3.xml><?xml version="1.0" encoding="utf-8"?>
+<p:sld xmlns:a="http://schemas.openxmlformats.org/drawingml/2006/main" xmlns:r="http://schemas.openxmlformats.org/officeDocument/2006/relationships" xmlns:p="http://schemas.openxmlformats.org/presentationml/2006/main">
+  <p:cSld>
+    <p:spTree>
+      <p:nvGrpSpPr>
+        <p:cNvPr id="1" name=""/>
+        <p:cNvGrpSpPr/>
+        <p:nvPr/>
+      </p:nvGrpSpPr>
+      <p:grpSpPr>
+        <a:xfrm>
+          <a:off x="0" y="0"/>
+          <a:ext cx="0" cy="0"/>
+          <a:chOff x="0" y="0"/>
+          <a:chExt cx="0" cy="0"/>
+        </a:xfrm>
+      </p:grpSpPr>
+      <p:sp>
+        <p:nvSpPr>
+          <p:cNvPr id="2" name="Title 1"/>
+          <p:cNvSpPr>
+            <a:spLocks noGrp="1"/>
+          </p:cNvSpPr>
+          <p:nvPr>
+            <p:ph type="title"/>
+          </p:nvPr>
+        </p:nvSpPr>
+        <p:spPr>
+          <a:gradFill flip="none" rotWithShape="1">
+            <a:gsLst>
+              <a:gs pos="0">
+                <a:schemeClr val="accent1">
+                  <a:tint val="66000"/>
+                  <a:satMod val="160000"/>
+                </a:schemeClr>
+              </a:gs>
+              <a:gs pos="50000">
+                <a:schemeClr val="accent1">
+                  <a:tint val="44500"/>
+                  <a:satMod val="160000"/>
+                </a:schemeClr>
+              </a:gs>
+              <a:gs pos="100000">
+                <a:schemeClr val="accent1">
+                  <a:tint val="23500"/>
+                  <a:satMod val="160000"/>
+                </a:schemeClr>
+              </a:gs>
+            </a:gsLst>
+            <a:lin ang="5400000" scaled="1"/>
+            <a:tileRect/>
+          </a:gradFill>
+        </p:spPr>
+        <p:txBody>
+          <a:bodyPr/>
+          <a:lstStyle/>
+          <a:p>
+            <a:pPr algn="ctr"/>
+            <a:r>
+              <a:rPr lang="en-US" dirty="0" smtClean="0"/>
+              <a:t>The Three Vs of Big Data</a:t>
+            </a:r>
+            <a:endParaRPr lang="en-US" dirty="0"/>
+          </a:p>
+        </p:txBody>
+      </p:sp>
+      <p:sp>
+        <p:nvSpPr>
+          <p:cNvPr id="3" name="Content Placeholder 2"/>
+          <p:cNvSpPr>
+            <a:spLocks noGrp="1"/>
+          </p:cNvSpPr>
+          <p:nvPr>
+            <p:ph idx="1"/>
+          </p:nvPr>
+        </p:nvSpPr>
+        <p:spPr/>
+        <p:txBody>
+          <a:bodyPr>
+            <a:normAutofit/>
+          </a:bodyPr>
+          <a:lstStyle/>
+          <a:p>
+            <a:pPr algn="just">
+              <a:lnSpc>
+                <a:spcPct val="150000"/>
+              </a:lnSpc>
+            </a:pPr>
+            <a:r>
+              <a:rPr lang="en-US" sz="3200" dirty="0" smtClean="0"/>
+              <a:t>Volume</a:t>
+            </a:r>
+            <a:endParaRPr lang="en-US" sz="3200" dirty="0"/>
+          </a:p>
+          <a:p>
+            <a:pPr algn="just">
+              <a:lnSpc>
+                <a:spcPct val="150000"/>
+              </a:lnSpc>
+            </a:pPr>
+            <a:r>
+              <a:rPr lang="en-US" sz="3200" dirty="0" smtClean="0"/>
+              <a:t>Velocity</a:t>
+            </a:r>
+            <a:endParaRPr lang="en-US" sz="3200" dirty="0"/>
+          </a:p>
+          <a:p>
+            <a:pPr algn="just">
+              <a:lnSpc>
+                <a:spcPct val="150000"/>
+              </a:lnSpc>
+            </a:pPr>
+            <a:r>
+              <a:rPr lang="en-US" sz="3200" dirty="0" smtClean="0"/>
+              <a:t>Variety</a:t>
+            </a:r>
+            <a:endParaRPr lang="en-US" sz="3200" dirty="0"/>
+          </a:p>
+        </p:txBody>
+      </p:sp>
+    </p:spTree>
+    <p:extLst>
+      <p:ext uri="{BB962C8B-B14F-4D97-AF65-F5344CB8AC3E}">
+        <p14:creationId xmlns:p14="http://schemas.microsoft.com/office/powerpoint/2010/main" val="1108393650"/>
+      </p:ext>
+    </p:extLst>
+  </p:cSld>
+  <p:clrMapOvr>
+    <a:masterClrMapping/>
+  </p:clrMapOvr>
+</p:sld>
+</file>
+
+<file path=ppt/slides/slide4.xml><?xml version="1.0" encoding="utf-8"?>
+<p:sld xmlns:a="http://schemas.openxmlformats.org/drawingml/2006/main" xmlns:r="http://schemas.openxmlformats.org/officeDocument/2006/relationships" xmlns:p="http://schemas.openxmlformats.org/presentationml/2006/main">
+  <p:cSld>
+    <p:spTree>
+      <p:nvGrpSpPr>
+        <p:cNvPr id="1" name=""/>
+        <p:cNvGrpSpPr/>
+        <p:nvPr/>
+      </p:nvGrpSpPr>
+      <p:grpSpPr>
+        <a:xfrm>
+          <a:off x="0" y="0"/>
+          <a:ext cx="0" cy="0"/>
+          <a:chOff x="0" y="0"/>
+          <a:chExt cx="0" cy="0"/>
+        </a:xfrm>
+      </p:grpSpPr>
+      <p:sp>
+        <p:nvSpPr>
+          <p:cNvPr id="2" name="Title 1"/>
+          <p:cNvSpPr>
+            <a:spLocks noGrp="1"/>
+          </p:cNvSpPr>
+          <p:nvPr>
+            <p:ph type="title"/>
+          </p:nvPr>
+        </p:nvSpPr>
+        <p:spPr>
+          <a:gradFill flip="none" rotWithShape="1">
+            <a:gsLst>
+              <a:gs pos="0">
+                <a:schemeClr val="accent1">
+                  <a:tint val="66000"/>
+                  <a:satMod val="160000"/>
+                </a:schemeClr>
+              </a:gs>
+              <a:gs pos="50000">
+                <a:schemeClr val="accent1">
+                  <a:tint val="44500"/>
+                  <a:satMod val="160000"/>
+                </a:schemeClr>
+              </a:gs>
+              <a:gs pos="100000">
+                <a:schemeClr val="accent1">
+                  <a:tint val="23500"/>
+                  <a:satMod val="160000"/>
+                </a:schemeClr>
+              </a:gs>
+            </a:gsLst>
+            <a:lin ang="5400000" scaled="1"/>
+            <a:tileRect/>
+          </a:gradFill>
+        </p:spPr>
+        <p:txBody>
+          <a:bodyPr/>
+          <a:lstStyle/>
+          <a:p>
+            <a:pPr algn="ctr"/>
+            <a:r>
+              <a:rPr lang="en-US" dirty="0" smtClean="0"/>
+              <a:t>Volume</a:t>
+            </a:r>
+            <a:endParaRPr lang="en-US" dirty="0"/>
+          </a:p>
+        </p:txBody>
+      </p:sp>
+      <p:sp>
+        <p:nvSpPr>
+          <p:cNvPr id="3" name="Content Placeholder 2"/>
+          <p:cNvSpPr>
+            <a:spLocks noGrp="1"/>
+          </p:cNvSpPr>
+          <p:nvPr>
+            <p:ph idx="1"/>
+          </p:nvPr>
+        </p:nvSpPr>
+        <p:spPr/>
+        <p:txBody>
+          <a:bodyPr>
+            <a:normAutofit/>
+          </a:bodyPr>
+          <a:lstStyle/>
+          <a:p>
+            <a:pPr algn="just">
+              <a:lnSpc>
+                <a:spcPct val="150000"/>
+              </a:lnSpc>
+            </a:pPr>
+            <a:r>
+              <a:rPr lang="en-US" sz="3200" dirty="0" smtClean="0"/>
+              <a:t>With </a:t>
+            </a:r>
+            <a:r>
+              <a:rPr lang="en-US" sz="3200" dirty="0"/>
+              <a:t>big data, you’ll have to process high volumes </a:t>
+            </a:r>
+            <a:r>
+              <a:rPr lang="en-US" sz="3200" dirty="0" smtClean="0"/>
+              <a:t>of data</a:t>
+            </a:r>
+            <a:r>
+              <a:rPr lang="en-US" sz="3200" dirty="0"/>
+              <a:t>. </a:t>
+            </a:r>
+            <a:r>
+              <a:rPr lang="en-US" sz="3200" dirty="0" smtClean="0"/>
+              <a:t>For </a:t>
+            </a:r>
+            <a:r>
+              <a:rPr lang="en-US" sz="3200" dirty="0"/>
+              <a:t>some organizations, this might be tens of terabytes of data. For others, it may be hundreds of petabytes.</a:t>
+            </a:r>
+          </a:p>
+        </p:txBody>
+      </p:sp>
+    </p:spTree>
+    <p:extLst>
+      <p:ext uri="{BB962C8B-B14F-4D97-AF65-F5344CB8AC3E}">
+        <p14:creationId xmlns:p14="http://schemas.microsoft.com/office/powerpoint/2010/main" val="3904802682"/>
+      </p:ext>
+    </p:extLst>
+  </p:cSld>
+  <p:clrMapOvr>
+    <a:masterClrMapping/>
+  </p:clrMapOvr>
+</p:sld>
+</file>
+
+<file path=ppt/slides/slide5.xml><?xml version="1.0" encoding="utf-8"?>
+<p:sld xmlns:a="http://schemas.openxmlformats.org/drawingml/2006/main" xmlns:r="http://schemas.openxmlformats.org/officeDocument/2006/relationships" xmlns:p="http://schemas.openxmlformats.org/presentationml/2006/main">
+  <p:cSld>
+    <p:spTree>
+      <p:nvGrpSpPr>
+        <p:cNvPr id="1" name=""/>
+        <p:cNvGrpSpPr/>
+        <p:nvPr/>
+      </p:nvGrpSpPr>
+      <p:grpSpPr>
+        <a:xfrm>
+          <a:off x="0" y="0"/>
+          <a:ext cx="0" cy="0"/>
+          <a:chOff x="0" y="0"/>
+          <a:chExt cx="0" cy="0"/>
+        </a:xfrm>
+      </p:grpSpPr>
+      <p:sp>
+        <p:nvSpPr>
+          <p:cNvPr id="2" name="Title 1"/>
+          <p:cNvSpPr>
+            <a:spLocks noGrp="1"/>
+          </p:cNvSpPr>
+          <p:nvPr>
+            <p:ph type="title"/>
+          </p:nvPr>
+        </p:nvSpPr>
+        <p:spPr>
+          <a:gradFill flip="none" rotWithShape="1">
+            <a:gsLst>
+              <a:gs pos="0">
+                <a:schemeClr val="accent1">
+                  <a:tint val="66000"/>
+                  <a:satMod val="160000"/>
+                </a:schemeClr>
+              </a:gs>
+              <a:gs pos="50000">
+                <a:schemeClr val="accent1">
+                  <a:tint val="44500"/>
+                  <a:satMod val="160000"/>
+                </a:schemeClr>
+              </a:gs>
+              <a:gs pos="100000">
+                <a:schemeClr val="accent1">
+                  <a:tint val="23500"/>
+                  <a:satMod val="160000"/>
+                </a:schemeClr>
+              </a:gs>
+            </a:gsLst>
+            <a:lin ang="5400000" scaled="1"/>
+            <a:tileRect/>
+          </a:gradFill>
+        </p:spPr>
+        <p:txBody>
+          <a:bodyPr/>
+          <a:lstStyle/>
+          <a:p>
+            <a:pPr algn="ctr"/>
+            <a:r>
+              <a:rPr lang="en-US" dirty="0" smtClean="0"/>
+              <a:t>Velocity</a:t>
+            </a:r>
+            <a:endParaRPr lang="en-US" dirty="0"/>
+          </a:p>
+        </p:txBody>
+      </p:sp>
+      <p:sp>
+        <p:nvSpPr>
+          <p:cNvPr id="3" name="Content Placeholder 2"/>
+          <p:cNvSpPr>
+            <a:spLocks noGrp="1"/>
+          </p:cNvSpPr>
+          <p:nvPr>
+            <p:ph idx="1"/>
+          </p:nvPr>
+        </p:nvSpPr>
+        <p:spPr/>
+        <p:txBody>
+          <a:bodyPr>
+            <a:normAutofit/>
+          </a:bodyPr>
+          <a:lstStyle/>
+          <a:p>
+            <a:pPr algn="just">
+              <a:lnSpc>
+                <a:spcPct val="150000"/>
+              </a:lnSpc>
+            </a:pPr>
+            <a:r>
+              <a:rPr lang="en-US" sz="3200" dirty="0"/>
+              <a:t>Velocity is the measure of how fast the data is coming in. </a:t>
+            </a:r>
+            <a:r>
+              <a:rPr lang="en-US" sz="3200" dirty="0" smtClean="0"/>
+              <a:t>Services like Facebook have </a:t>
+            </a:r>
+            <a:r>
+              <a:rPr lang="en-US" sz="3200" dirty="0"/>
+              <a:t>to handle a tsunami of </a:t>
+            </a:r>
+            <a:r>
+              <a:rPr lang="en-US" sz="3200" dirty="0" smtClean="0"/>
+              <a:t>data </a:t>
+            </a:r>
+            <a:r>
+              <a:rPr lang="en-US" sz="3200" dirty="0"/>
+              <a:t>every day. </a:t>
+            </a:r>
+            <a:r>
+              <a:rPr lang="en-US" sz="3200" dirty="0" smtClean="0"/>
+              <a:t>They have </a:t>
+            </a:r>
+            <a:r>
+              <a:rPr lang="en-US" sz="3200" dirty="0"/>
+              <a:t>to ingest it all, process it, </a:t>
+            </a:r>
+            <a:r>
+              <a:rPr lang="en-US" sz="3200" dirty="0" smtClean="0"/>
+              <a:t>record </a:t>
+            </a:r>
+            <a:r>
+              <a:rPr lang="en-US" sz="3200" dirty="0"/>
+              <a:t>it, and somehow, later, be able to retrieve it.</a:t>
+            </a:r>
+          </a:p>
+        </p:txBody>
+      </p:sp>
+    </p:spTree>
+    <p:extLst>
+      <p:ext uri="{BB962C8B-B14F-4D97-AF65-F5344CB8AC3E}">
+        <p14:creationId xmlns:p14="http://schemas.microsoft.com/office/powerpoint/2010/main" val="3472644302"/>
+      </p:ext>
+    </p:extLst>
+  </p:cSld>
+  <p:clrMapOvr>
+    <a:masterClrMapping/>
+  </p:clrMapOvr>
+</p:sld>
+</file>
+
+<file path=ppt/slides/slide6.xml><?xml version="1.0" encoding="utf-8"?>
+<p:sld xmlns:a="http://schemas.openxmlformats.org/drawingml/2006/main" xmlns:r="http://schemas.openxmlformats.org/officeDocument/2006/relationships" xmlns:p="http://schemas.openxmlformats.org/presentationml/2006/main">
+  <p:cSld>
+    <p:spTree>
+      <p:nvGrpSpPr>
+        <p:cNvPr id="1" name=""/>
+        <p:cNvGrpSpPr/>
+        <p:nvPr/>
+      </p:nvGrpSpPr>
+      <p:grpSpPr>
+        <a:xfrm>
+          <a:off x="0" y="0"/>
+          <a:ext cx="0" cy="0"/>
+          <a:chOff x="0" y="0"/>
+          <a:chExt cx="0" cy="0"/>
+        </a:xfrm>
+      </p:grpSpPr>
+      <p:sp>
+        <p:nvSpPr>
+          <p:cNvPr id="2" name="Title 1"/>
+          <p:cNvSpPr>
+            <a:spLocks noGrp="1"/>
+          </p:cNvSpPr>
+          <p:nvPr>
+            <p:ph type="title"/>
+          </p:nvPr>
+        </p:nvSpPr>
+        <p:spPr>
+          <a:gradFill flip="none" rotWithShape="1">
+            <a:gsLst>
+              <a:gs pos="0">
+                <a:schemeClr val="accent1">
+                  <a:tint val="66000"/>
+                  <a:satMod val="160000"/>
+                </a:schemeClr>
+              </a:gs>
+              <a:gs pos="50000">
+                <a:schemeClr val="accent1">
+                  <a:tint val="44500"/>
+                  <a:satMod val="160000"/>
+                </a:schemeClr>
+              </a:gs>
+              <a:gs pos="100000">
+                <a:schemeClr val="accent1">
+                  <a:tint val="23500"/>
+                  <a:satMod val="160000"/>
+                </a:schemeClr>
+              </a:gs>
+            </a:gsLst>
+            <a:lin ang="5400000" scaled="1"/>
+            <a:tileRect/>
+          </a:gradFill>
+        </p:spPr>
+        <p:txBody>
+          <a:bodyPr/>
+          <a:lstStyle/>
+          <a:p>
+            <a:pPr algn="ctr"/>
+            <a:r>
+              <a:rPr lang="en-US" dirty="0" smtClean="0"/>
+              <a:t>Variety</a:t>
+            </a:r>
+            <a:endParaRPr lang="en-US" dirty="0"/>
+          </a:p>
+        </p:txBody>
+      </p:sp>
+      <p:sp>
+        <p:nvSpPr>
+          <p:cNvPr id="3" name="Content Placeholder 2"/>
+          <p:cNvSpPr>
+            <a:spLocks noGrp="1"/>
+          </p:cNvSpPr>
+          <p:nvPr>
+            <p:ph idx="1"/>
+          </p:nvPr>
+        </p:nvSpPr>
+        <p:spPr/>
+        <p:txBody>
+          <a:bodyPr>
+            <a:normAutofit/>
+          </a:bodyPr>
+          <a:lstStyle/>
+          <a:p>
+            <a:pPr algn="just">
+              <a:lnSpc>
+                <a:spcPct val="150000"/>
+              </a:lnSpc>
+            </a:pPr>
+            <a:r>
+              <a:rPr lang="en-US" sz="3200" dirty="0"/>
+              <a:t>Variety refers to the many types of data that are available. Traditional data types were structured and </a:t>
+            </a:r>
+            <a:r>
+              <a:rPr lang="en-US" sz="3200" dirty="0" smtClean="0"/>
+              <a:t>usually fit in </a:t>
+            </a:r>
+            <a:r>
+              <a:rPr lang="en-US" sz="3200" dirty="0"/>
+              <a:t>a </a:t>
+            </a:r>
+            <a:r>
+              <a:rPr lang="en-US" sz="3200" dirty="0" smtClean="0"/>
+              <a:t>single relational </a:t>
+            </a:r>
+            <a:r>
+              <a:rPr lang="en-US" sz="3200" dirty="0"/>
+              <a:t>database. With the rise of big data, data comes in new unstructured </a:t>
+            </a:r>
+            <a:r>
+              <a:rPr lang="en-US" sz="3200" dirty="0" smtClean="0"/>
+              <a:t>types, as well as traditional structured types.</a:t>
+            </a:r>
+            <a:endParaRPr lang="en-US" sz="3200" dirty="0"/>
+          </a:p>
+        </p:txBody>
+      </p:sp>
+    </p:spTree>
+    <p:extLst>
+      <p:ext uri="{BB962C8B-B14F-4D97-AF65-F5344CB8AC3E}">
+        <p14:creationId xmlns:p14="http://schemas.microsoft.com/office/powerpoint/2010/main" val="2903587621"/>
+      </p:ext>
+    </p:extLst>
+  </p:cSld>
+  <p:clrMapOvr>
+    <a:masterClrMapping/>
+  </p:clrMapOvr>
+</p:sld>
+</file>
+
 <file path=ppt/theme/theme1.xml><?xml version="1.0" encoding="utf-8"?>
 <a:theme xmlns:a="http://schemas.openxmlformats.org/drawingml/2006/main" name="Office Theme">
   <a:themeElements>

</xml_diff>

<commit_message>
Finished types of scaling
</commit_message>
<xml_diff>
--- a/Advanced DBMS Presentation.pptx
+++ b/Advanced DBMS Presentation.pptx
@@ -11,6 +11,14 @@
     <p:sldId id="259" r:id="rId5"/>
     <p:sldId id="260" r:id="rId6"/>
     <p:sldId id="261" r:id="rId7"/>
+    <p:sldId id="262" r:id="rId8"/>
+    <p:sldId id="263" r:id="rId9"/>
+    <p:sldId id="264" r:id="rId10"/>
+    <p:sldId id="265" r:id="rId11"/>
+    <p:sldId id="266" r:id="rId12"/>
+    <p:sldId id="267" r:id="rId13"/>
+    <p:sldId id="268" r:id="rId14"/>
+    <p:sldId id="269" r:id="rId15"/>
   </p:sldIdLst>
   <p:sldSz cx="12192000" cy="6858000"/>
   <p:notesSz cx="6858000" cy="9144000"/>
@@ -248,7 +256,7 @@
           <a:p>
             <a:fld id="{D2D16D22-5ED1-465B-83E5-FE6CA2D3437B}" type="datetimeFigureOut">
               <a:rPr lang="en-US" smtClean="0"/>
-              <a:t>5/27/2021</a:t>
+              <a:t>5/28/2021</a:t>
             </a:fld>
             <a:endParaRPr lang="en-US"/>
           </a:p>
@@ -418,7 +426,7 @@
           <a:p>
             <a:fld id="{D2D16D22-5ED1-465B-83E5-FE6CA2D3437B}" type="datetimeFigureOut">
               <a:rPr lang="en-US" smtClean="0"/>
-              <a:t>5/27/2021</a:t>
+              <a:t>5/28/2021</a:t>
             </a:fld>
             <a:endParaRPr lang="en-US"/>
           </a:p>
@@ -598,7 +606,7 @@
           <a:p>
             <a:fld id="{D2D16D22-5ED1-465B-83E5-FE6CA2D3437B}" type="datetimeFigureOut">
               <a:rPr lang="en-US" smtClean="0"/>
-              <a:t>5/27/2021</a:t>
+              <a:t>5/28/2021</a:t>
             </a:fld>
             <a:endParaRPr lang="en-US"/>
           </a:p>
@@ -768,7 +776,7 @@
           <a:p>
             <a:fld id="{D2D16D22-5ED1-465B-83E5-FE6CA2D3437B}" type="datetimeFigureOut">
               <a:rPr lang="en-US" smtClean="0"/>
-              <a:t>5/27/2021</a:t>
+              <a:t>5/28/2021</a:t>
             </a:fld>
             <a:endParaRPr lang="en-US"/>
           </a:p>
@@ -1014,7 +1022,7 @@
           <a:p>
             <a:fld id="{D2D16D22-5ED1-465B-83E5-FE6CA2D3437B}" type="datetimeFigureOut">
               <a:rPr lang="en-US" smtClean="0"/>
-              <a:t>5/27/2021</a:t>
+              <a:t>5/28/2021</a:t>
             </a:fld>
             <a:endParaRPr lang="en-US"/>
           </a:p>
@@ -1246,7 +1254,7 @@
           <a:p>
             <a:fld id="{D2D16D22-5ED1-465B-83E5-FE6CA2D3437B}" type="datetimeFigureOut">
               <a:rPr lang="en-US" smtClean="0"/>
-              <a:t>5/27/2021</a:t>
+              <a:t>5/28/2021</a:t>
             </a:fld>
             <a:endParaRPr lang="en-US"/>
           </a:p>
@@ -1613,7 +1621,7 @@
           <a:p>
             <a:fld id="{D2D16D22-5ED1-465B-83E5-FE6CA2D3437B}" type="datetimeFigureOut">
               <a:rPr lang="en-US" smtClean="0"/>
-              <a:t>5/27/2021</a:t>
+              <a:t>5/28/2021</a:t>
             </a:fld>
             <a:endParaRPr lang="en-US"/>
           </a:p>
@@ -1731,7 +1739,7 @@
           <a:p>
             <a:fld id="{D2D16D22-5ED1-465B-83E5-FE6CA2D3437B}" type="datetimeFigureOut">
               <a:rPr lang="en-US" smtClean="0"/>
-              <a:t>5/27/2021</a:t>
+              <a:t>5/28/2021</a:t>
             </a:fld>
             <a:endParaRPr lang="en-US"/>
           </a:p>
@@ -1826,7 +1834,7 @@
           <a:p>
             <a:fld id="{D2D16D22-5ED1-465B-83E5-FE6CA2D3437B}" type="datetimeFigureOut">
               <a:rPr lang="en-US" smtClean="0"/>
-              <a:t>5/27/2021</a:t>
+              <a:t>5/28/2021</a:t>
             </a:fld>
             <a:endParaRPr lang="en-US"/>
           </a:p>
@@ -2103,7 +2111,7 @@
           <a:p>
             <a:fld id="{D2D16D22-5ED1-465B-83E5-FE6CA2D3437B}" type="datetimeFigureOut">
               <a:rPr lang="en-US" smtClean="0"/>
-              <a:t>5/27/2021</a:t>
+              <a:t>5/28/2021</a:t>
             </a:fld>
             <a:endParaRPr lang="en-US"/>
           </a:p>
@@ -2356,7 +2364,7 @@
           <a:p>
             <a:fld id="{D2D16D22-5ED1-465B-83E5-FE6CA2D3437B}" type="datetimeFigureOut">
               <a:rPr lang="en-US" smtClean="0"/>
-              <a:t>5/27/2021</a:t>
+              <a:t>5/28/2021</a:t>
             </a:fld>
             <a:endParaRPr lang="en-US"/>
           </a:p>
@@ -2569,7 +2577,7 @@
           <a:p>
             <a:fld id="{D2D16D22-5ED1-465B-83E5-FE6CA2D3437B}" type="datetimeFigureOut">
               <a:rPr lang="en-US" smtClean="0"/>
-              <a:t>5/27/2021</a:t>
+              <a:t>5/28/2021</a:t>
             </a:fld>
             <a:endParaRPr lang="en-US"/>
           </a:p>
@@ -3054,6 +3062,583 @@
 </p:sld>
 </file>
 
+<file path=ppt/slides/slide10.xml><?xml version="1.0" encoding="utf-8"?>
+<p:sld xmlns:a="http://schemas.openxmlformats.org/drawingml/2006/main" xmlns:r="http://schemas.openxmlformats.org/officeDocument/2006/relationships" xmlns:p="http://schemas.openxmlformats.org/presentationml/2006/main">
+  <p:cSld>
+    <p:spTree>
+      <p:nvGrpSpPr>
+        <p:cNvPr id="1" name=""/>
+        <p:cNvGrpSpPr/>
+        <p:nvPr/>
+      </p:nvGrpSpPr>
+      <p:grpSpPr>
+        <a:xfrm>
+          <a:off x="0" y="0"/>
+          <a:ext cx="0" cy="0"/>
+          <a:chOff x="0" y="0"/>
+          <a:chExt cx="0" cy="0"/>
+        </a:xfrm>
+      </p:grpSpPr>
+      <p:sp>
+        <p:nvSpPr>
+          <p:cNvPr id="2" name="Title 1"/>
+          <p:cNvSpPr>
+            <a:spLocks noGrp="1"/>
+          </p:cNvSpPr>
+          <p:nvPr>
+            <p:ph type="title"/>
+          </p:nvPr>
+        </p:nvSpPr>
+        <p:spPr>
+          <a:gradFill flip="none" rotWithShape="1">
+            <a:gsLst>
+              <a:gs pos="0">
+                <a:schemeClr val="accent1">
+                  <a:tint val="66000"/>
+                  <a:satMod val="160000"/>
+                </a:schemeClr>
+              </a:gs>
+              <a:gs pos="50000">
+                <a:schemeClr val="accent1">
+                  <a:tint val="44500"/>
+                  <a:satMod val="160000"/>
+                </a:schemeClr>
+              </a:gs>
+              <a:gs pos="100000">
+                <a:schemeClr val="accent1">
+                  <a:tint val="23500"/>
+                  <a:satMod val="160000"/>
+                </a:schemeClr>
+              </a:gs>
+            </a:gsLst>
+            <a:lin ang="5400000" scaled="1"/>
+            <a:tileRect/>
+          </a:gradFill>
+        </p:spPr>
+        <p:txBody>
+          <a:bodyPr/>
+          <a:lstStyle/>
+          <a:p>
+            <a:pPr algn="ctr"/>
+            <a:r>
+              <a:rPr lang="en-US" dirty="0" smtClean="0"/>
+              <a:t>Vertical Scaling</a:t>
+            </a:r>
+            <a:endParaRPr lang="en-US" dirty="0"/>
+          </a:p>
+        </p:txBody>
+      </p:sp>
+      <p:sp>
+        <p:nvSpPr>
+          <p:cNvPr id="3" name="Content Placeholder 2"/>
+          <p:cNvSpPr>
+            <a:spLocks noGrp="1"/>
+          </p:cNvSpPr>
+          <p:nvPr>
+            <p:ph idx="1"/>
+          </p:nvPr>
+        </p:nvSpPr>
+        <p:spPr/>
+        <p:txBody>
+          <a:bodyPr>
+            <a:normAutofit/>
+          </a:bodyPr>
+          <a:lstStyle/>
+          <a:p>
+            <a:pPr algn="just">
+              <a:lnSpc>
+                <a:spcPct val="150000"/>
+              </a:lnSpc>
+            </a:pPr>
+            <a:r>
+              <a:rPr lang="en-US" sz="3200" dirty="0"/>
+              <a:t>Vertical scaling is limited to the capacity of one machine, scaling beyond that capacity can involve downtime and has an upper hard limit, i.e. the scale of the hardware on which you are currently running.</a:t>
+            </a:r>
+            <a:endParaRPr lang="en-US" sz="3200" dirty="0"/>
+          </a:p>
+        </p:txBody>
+      </p:sp>
+    </p:spTree>
+    <p:extLst>
+      <p:ext uri="{BB962C8B-B14F-4D97-AF65-F5344CB8AC3E}">
+        <p14:creationId xmlns:p14="http://schemas.microsoft.com/office/powerpoint/2010/main" val="1074870072"/>
+      </p:ext>
+    </p:extLst>
+  </p:cSld>
+  <p:clrMapOvr>
+    <a:masterClrMapping/>
+  </p:clrMapOvr>
+</p:sld>
+</file>
+
+<file path=ppt/slides/slide11.xml><?xml version="1.0" encoding="utf-8"?>
+<p:sld xmlns:a="http://schemas.openxmlformats.org/drawingml/2006/main" xmlns:r="http://schemas.openxmlformats.org/officeDocument/2006/relationships" xmlns:p="http://schemas.openxmlformats.org/presentationml/2006/main">
+  <p:cSld>
+    <p:spTree>
+      <p:nvGrpSpPr>
+        <p:cNvPr id="1" name=""/>
+        <p:cNvGrpSpPr/>
+        <p:nvPr/>
+      </p:nvGrpSpPr>
+      <p:grpSpPr>
+        <a:xfrm>
+          <a:off x="0" y="0"/>
+          <a:ext cx="0" cy="0"/>
+          <a:chOff x="0" y="0"/>
+          <a:chExt cx="0" cy="0"/>
+        </a:xfrm>
+      </p:grpSpPr>
+      <p:sp>
+        <p:nvSpPr>
+          <p:cNvPr id="2" name="Title 1"/>
+          <p:cNvSpPr>
+            <a:spLocks noGrp="1"/>
+          </p:cNvSpPr>
+          <p:nvPr>
+            <p:ph type="title"/>
+          </p:nvPr>
+        </p:nvSpPr>
+        <p:spPr>
+          <a:gradFill flip="none" rotWithShape="1">
+            <a:gsLst>
+              <a:gs pos="0">
+                <a:schemeClr val="accent1">
+                  <a:tint val="66000"/>
+                  <a:satMod val="160000"/>
+                </a:schemeClr>
+              </a:gs>
+              <a:gs pos="50000">
+                <a:schemeClr val="accent1">
+                  <a:tint val="44500"/>
+                  <a:satMod val="160000"/>
+                </a:schemeClr>
+              </a:gs>
+              <a:gs pos="100000">
+                <a:schemeClr val="accent1">
+                  <a:tint val="23500"/>
+                  <a:satMod val="160000"/>
+                </a:schemeClr>
+              </a:gs>
+            </a:gsLst>
+            <a:lin ang="5400000" scaled="1"/>
+            <a:tileRect/>
+          </a:gradFill>
+        </p:spPr>
+        <p:txBody>
+          <a:bodyPr/>
+          <a:lstStyle/>
+          <a:p>
+            <a:pPr algn="ctr"/>
+            <a:r>
+              <a:rPr lang="en-US" dirty="0" smtClean="0"/>
+              <a:t>Horizontal Scaling</a:t>
+            </a:r>
+            <a:endParaRPr lang="en-US" dirty="0"/>
+          </a:p>
+        </p:txBody>
+      </p:sp>
+      <p:sp>
+        <p:nvSpPr>
+          <p:cNvPr id="3" name="Content Placeholder 2"/>
+          <p:cNvSpPr>
+            <a:spLocks noGrp="1"/>
+          </p:cNvSpPr>
+          <p:nvPr>
+            <p:ph idx="1"/>
+          </p:nvPr>
+        </p:nvSpPr>
+        <p:spPr/>
+        <p:txBody>
+          <a:bodyPr>
+            <a:normAutofit/>
+          </a:bodyPr>
+          <a:lstStyle/>
+          <a:p>
+            <a:pPr algn="just">
+              <a:lnSpc>
+                <a:spcPct val="150000"/>
+              </a:lnSpc>
+            </a:pPr>
+            <a:endParaRPr lang="en-US" sz="3200" dirty="0" smtClean="0"/>
+          </a:p>
+          <a:p>
+            <a:pPr algn="just">
+              <a:lnSpc>
+                <a:spcPct val="150000"/>
+              </a:lnSpc>
+            </a:pPr>
+            <a:r>
+              <a:rPr lang="en-US" sz="3200" dirty="0" smtClean="0"/>
+              <a:t>Horizontal Scaling </a:t>
+            </a:r>
+            <a:r>
+              <a:rPr lang="en-US" sz="3200" dirty="0"/>
+              <a:t>means scaling by adding more machines to your pool of </a:t>
+            </a:r>
+            <a:r>
+              <a:rPr lang="en-US" sz="3200" dirty="0" smtClean="0"/>
+              <a:t>resources.</a:t>
+            </a:r>
+            <a:endParaRPr lang="en-US" sz="3200" dirty="0"/>
+          </a:p>
+        </p:txBody>
+      </p:sp>
+    </p:spTree>
+    <p:extLst>
+      <p:ext uri="{BB962C8B-B14F-4D97-AF65-F5344CB8AC3E}">
+        <p14:creationId xmlns:p14="http://schemas.microsoft.com/office/powerpoint/2010/main" val="3672433749"/>
+      </p:ext>
+    </p:extLst>
+  </p:cSld>
+  <p:clrMapOvr>
+    <a:masterClrMapping/>
+  </p:clrMapOvr>
+</p:sld>
+</file>
+
+<file path=ppt/slides/slide12.xml><?xml version="1.0" encoding="utf-8"?>
+<p:sld xmlns:a="http://schemas.openxmlformats.org/drawingml/2006/main" xmlns:r="http://schemas.openxmlformats.org/officeDocument/2006/relationships" xmlns:p="http://schemas.openxmlformats.org/presentationml/2006/main">
+  <p:cSld>
+    <p:spTree>
+      <p:nvGrpSpPr>
+        <p:cNvPr id="1" name=""/>
+        <p:cNvGrpSpPr/>
+        <p:nvPr/>
+      </p:nvGrpSpPr>
+      <p:grpSpPr>
+        <a:xfrm>
+          <a:off x="0" y="0"/>
+          <a:ext cx="0" cy="0"/>
+          <a:chOff x="0" y="0"/>
+          <a:chExt cx="0" cy="0"/>
+        </a:xfrm>
+      </p:grpSpPr>
+      <p:sp>
+        <p:nvSpPr>
+          <p:cNvPr id="2" name="Title 1"/>
+          <p:cNvSpPr>
+            <a:spLocks noGrp="1"/>
+          </p:cNvSpPr>
+          <p:nvPr>
+            <p:ph type="title"/>
+          </p:nvPr>
+        </p:nvSpPr>
+        <p:spPr>
+          <a:gradFill flip="none" rotWithShape="1">
+            <a:gsLst>
+              <a:gs pos="0">
+                <a:schemeClr val="accent1">
+                  <a:tint val="66000"/>
+                  <a:satMod val="160000"/>
+                </a:schemeClr>
+              </a:gs>
+              <a:gs pos="50000">
+                <a:schemeClr val="accent1">
+                  <a:tint val="44500"/>
+                  <a:satMod val="160000"/>
+                </a:schemeClr>
+              </a:gs>
+              <a:gs pos="100000">
+                <a:schemeClr val="accent1">
+                  <a:tint val="23500"/>
+                  <a:satMod val="160000"/>
+                </a:schemeClr>
+              </a:gs>
+            </a:gsLst>
+            <a:lin ang="5400000" scaled="1"/>
+            <a:tileRect/>
+          </a:gradFill>
+        </p:spPr>
+        <p:txBody>
+          <a:bodyPr/>
+          <a:lstStyle/>
+          <a:p>
+            <a:pPr algn="ctr"/>
+            <a:r>
+              <a:rPr lang="en-US" dirty="0" smtClean="0"/>
+              <a:t>Horizontal Scaling</a:t>
+            </a:r>
+            <a:endParaRPr lang="en-US" dirty="0"/>
+          </a:p>
+        </p:txBody>
+      </p:sp>
+      <p:sp>
+        <p:nvSpPr>
+          <p:cNvPr id="3" name="Content Placeholder 2"/>
+          <p:cNvSpPr>
+            <a:spLocks noGrp="1"/>
+          </p:cNvSpPr>
+          <p:nvPr>
+            <p:ph idx="1"/>
+          </p:nvPr>
+        </p:nvSpPr>
+        <p:spPr/>
+        <p:txBody>
+          <a:bodyPr>
+            <a:normAutofit/>
+          </a:bodyPr>
+          <a:lstStyle/>
+          <a:p>
+            <a:pPr algn="just">
+              <a:lnSpc>
+                <a:spcPct val="150000"/>
+              </a:lnSpc>
+            </a:pPr>
+            <a:r>
+              <a:rPr lang="en-US" sz="3200" dirty="0"/>
+              <a:t>In theory, adding more machines to the existing pool means you are not limited to the capacity of a single unit, making it possible to scale with less downtime.</a:t>
+            </a:r>
+            <a:endParaRPr lang="en-US" sz="3200" dirty="0"/>
+          </a:p>
+        </p:txBody>
+      </p:sp>
+    </p:spTree>
+    <p:extLst>
+      <p:ext uri="{BB962C8B-B14F-4D97-AF65-F5344CB8AC3E}">
+        <p14:creationId xmlns:p14="http://schemas.microsoft.com/office/powerpoint/2010/main" val="2265946247"/>
+      </p:ext>
+    </p:extLst>
+  </p:cSld>
+  <p:clrMapOvr>
+    <a:masterClrMapping/>
+  </p:clrMapOvr>
+</p:sld>
+</file>
+
+<file path=ppt/slides/slide13.xml><?xml version="1.0" encoding="utf-8"?>
+<p:sld xmlns:a="http://schemas.openxmlformats.org/drawingml/2006/main" xmlns:r="http://schemas.openxmlformats.org/officeDocument/2006/relationships" xmlns:p="http://schemas.openxmlformats.org/presentationml/2006/main">
+  <p:cSld>
+    <p:spTree>
+      <p:nvGrpSpPr>
+        <p:cNvPr id="1" name=""/>
+        <p:cNvGrpSpPr/>
+        <p:nvPr/>
+      </p:nvGrpSpPr>
+      <p:grpSpPr>
+        <a:xfrm>
+          <a:off x="0" y="0"/>
+          <a:ext cx="0" cy="0"/>
+          <a:chOff x="0" y="0"/>
+          <a:chExt cx="0" cy="0"/>
+        </a:xfrm>
+      </p:grpSpPr>
+      <p:sp>
+        <p:nvSpPr>
+          <p:cNvPr id="2" name="Title 1"/>
+          <p:cNvSpPr>
+            <a:spLocks noGrp="1"/>
+          </p:cNvSpPr>
+          <p:nvPr>
+            <p:ph type="title"/>
+          </p:nvPr>
+        </p:nvSpPr>
+        <p:spPr>
+          <a:gradFill flip="none" rotWithShape="1">
+            <a:gsLst>
+              <a:gs pos="0">
+                <a:schemeClr val="accent1">
+                  <a:tint val="66000"/>
+                  <a:satMod val="160000"/>
+                </a:schemeClr>
+              </a:gs>
+              <a:gs pos="50000">
+                <a:schemeClr val="accent1">
+                  <a:tint val="44500"/>
+                  <a:satMod val="160000"/>
+                </a:schemeClr>
+              </a:gs>
+              <a:gs pos="100000">
+                <a:schemeClr val="accent1">
+                  <a:tint val="23500"/>
+                  <a:satMod val="160000"/>
+                </a:schemeClr>
+              </a:gs>
+            </a:gsLst>
+            <a:lin ang="5400000" scaled="1"/>
+            <a:tileRect/>
+          </a:gradFill>
+        </p:spPr>
+        <p:txBody>
+          <a:bodyPr/>
+          <a:lstStyle/>
+          <a:p>
+            <a:pPr algn="ctr"/>
+            <a:r>
+              <a:rPr lang="en-US" dirty="0" smtClean="0"/>
+              <a:t>Types of Scaling</a:t>
+            </a:r>
+            <a:endParaRPr lang="en-US" dirty="0"/>
+          </a:p>
+        </p:txBody>
+      </p:sp>
+      <p:sp>
+        <p:nvSpPr>
+          <p:cNvPr id="3" name="Content Placeholder 2"/>
+          <p:cNvSpPr>
+            <a:spLocks noGrp="1"/>
+          </p:cNvSpPr>
+          <p:nvPr>
+            <p:ph idx="1"/>
+          </p:nvPr>
+        </p:nvSpPr>
+        <p:spPr/>
+        <p:txBody>
+          <a:bodyPr>
+            <a:normAutofit/>
+          </a:bodyPr>
+          <a:lstStyle/>
+          <a:p>
+            <a:pPr algn="just">
+              <a:lnSpc>
+                <a:spcPct val="150000"/>
+              </a:lnSpc>
+            </a:pPr>
+            <a:r>
+              <a:rPr lang="en-US" sz="3200" dirty="0"/>
+              <a:t>One of the fundamental differences between </a:t>
+            </a:r>
+            <a:r>
+              <a:rPr lang="en-US" sz="3200" dirty="0" smtClean="0"/>
+              <a:t>horizontal scaling and vertical scaling </a:t>
+            </a:r>
+            <a:r>
+              <a:rPr lang="en-US" sz="3200" dirty="0"/>
+              <a:t>is that horizontal scaling requires breaking a sequential piece of logic into smaller </a:t>
+            </a:r>
+            <a:r>
+              <a:rPr lang="en-US" sz="3200" dirty="0" smtClean="0"/>
+              <a:t>pieces, </a:t>
+            </a:r>
+            <a:r>
+              <a:rPr lang="en-US" sz="3200" dirty="0"/>
+              <a:t>so that they can be executed in parallel across multiple machines.</a:t>
+            </a:r>
+            <a:endParaRPr lang="en-US" sz="3200" dirty="0"/>
+          </a:p>
+        </p:txBody>
+      </p:sp>
+    </p:spTree>
+    <p:extLst>
+      <p:ext uri="{BB962C8B-B14F-4D97-AF65-F5344CB8AC3E}">
+        <p14:creationId xmlns:p14="http://schemas.microsoft.com/office/powerpoint/2010/main" val="3064190601"/>
+      </p:ext>
+    </p:extLst>
+  </p:cSld>
+  <p:clrMapOvr>
+    <a:masterClrMapping/>
+  </p:clrMapOvr>
+</p:sld>
+</file>
+
+<file path=ppt/slides/slide14.xml><?xml version="1.0" encoding="utf-8"?>
+<p:sld xmlns:a="http://schemas.openxmlformats.org/drawingml/2006/main" xmlns:r="http://schemas.openxmlformats.org/officeDocument/2006/relationships" xmlns:p="http://schemas.openxmlformats.org/presentationml/2006/main">
+  <p:cSld>
+    <p:spTree>
+      <p:nvGrpSpPr>
+        <p:cNvPr id="1" name=""/>
+        <p:cNvGrpSpPr/>
+        <p:nvPr/>
+      </p:nvGrpSpPr>
+      <p:grpSpPr>
+        <a:xfrm>
+          <a:off x="0" y="0"/>
+          <a:ext cx="0" cy="0"/>
+          <a:chOff x="0" y="0"/>
+          <a:chExt cx="0" cy="0"/>
+        </a:xfrm>
+      </p:grpSpPr>
+      <p:sp>
+        <p:nvSpPr>
+          <p:cNvPr id="2" name="Title 1"/>
+          <p:cNvSpPr>
+            <a:spLocks noGrp="1"/>
+          </p:cNvSpPr>
+          <p:nvPr>
+            <p:ph type="title"/>
+          </p:nvPr>
+        </p:nvSpPr>
+        <p:spPr>
+          <a:gradFill flip="none" rotWithShape="1">
+            <a:gsLst>
+              <a:gs pos="0">
+                <a:schemeClr val="accent1">
+                  <a:tint val="66000"/>
+                  <a:satMod val="160000"/>
+                </a:schemeClr>
+              </a:gs>
+              <a:gs pos="50000">
+                <a:schemeClr val="accent1">
+                  <a:tint val="44500"/>
+                  <a:satMod val="160000"/>
+                </a:schemeClr>
+              </a:gs>
+              <a:gs pos="100000">
+                <a:schemeClr val="accent1">
+                  <a:tint val="23500"/>
+                  <a:satMod val="160000"/>
+                </a:schemeClr>
+              </a:gs>
+            </a:gsLst>
+            <a:lin ang="5400000" scaled="1"/>
+            <a:tileRect/>
+          </a:gradFill>
+        </p:spPr>
+        <p:txBody>
+          <a:bodyPr/>
+          <a:lstStyle/>
+          <a:p>
+            <a:pPr algn="ctr"/>
+            <a:r>
+              <a:rPr lang="en-US" dirty="0" smtClean="0"/>
+              <a:t>Types of Scaling</a:t>
+            </a:r>
+            <a:endParaRPr lang="en-US" dirty="0"/>
+          </a:p>
+        </p:txBody>
+      </p:sp>
+      <p:sp>
+        <p:nvSpPr>
+          <p:cNvPr id="3" name="Content Placeholder 2"/>
+          <p:cNvSpPr>
+            <a:spLocks noGrp="1"/>
+          </p:cNvSpPr>
+          <p:nvPr>
+            <p:ph idx="1"/>
+          </p:nvPr>
+        </p:nvSpPr>
+        <p:spPr/>
+        <p:txBody>
+          <a:bodyPr>
+            <a:normAutofit/>
+          </a:bodyPr>
+          <a:lstStyle/>
+          <a:p>
+            <a:pPr algn="just">
+              <a:lnSpc>
+                <a:spcPct val="150000"/>
+              </a:lnSpc>
+            </a:pPr>
+            <a:r>
+              <a:rPr lang="en-US" sz="3200" dirty="0"/>
+              <a:t>In many respects, vertical scaling is easier because the logic really doesn’t need to change. Rather, you’re just running the same code on higher-spec machines.</a:t>
+            </a:r>
+            <a:endParaRPr lang="en-US" sz="3200" dirty="0"/>
+          </a:p>
+        </p:txBody>
+      </p:sp>
+    </p:spTree>
+    <p:extLst>
+      <p:ext uri="{BB962C8B-B14F-4D97-AF65-F5344CB8AC3E}">
+        <p14:creationId xmlns:p14="http://schemas.microsoft.com/office/powerpoint/2010/main" val="3728352779"/>
+      </p:ext>
+    </p:extLst>
+  </p:cSld>
+  <p:clrMapOvr>
+    <a:masterClrMapping/>
+  </p:clrMapOvr>
+</p:sld>
+</file>
+
 <file path=ppt/slides/slide2.xml><?xml version="1.0" encoding="utf-8"?>
 <p:sld xmlns:a="http://schemas.openxmlformats.org/drawingml/2006/main" xmlns:r="http://schemas.openxmlformats.org/officeDocument/2006/relationships" xmlns:p="http://schemas.openxmlformats.org/presentationml/2006/main">
   <p:cSld>
@@ -3695,6 +4280,399 @@
     <p:extLst>
       <p:ext uri="{BB962C8B-B14F-4D97-AF65-F5344CB8AC3E}">
         <p14:creationId xmlns:p14="http://schemas.microsoft.com/office/powerpoint/2010/main" val="2903587621"/>
+      </p:ext>
+    </p:extLst>
+  </p:cSld>
+  <p:clrMapOvr>
+    <a:masterClrMapping/>
+  </p:clrMapOvr>
+</p:sld>
+</file>
+
+<file path=ppt/slides/slide7.xml><?xml version="1.0" encoding="utf-8"?>
+<p:sld xmlns:a="http://schemas.openxmlformats.org/drawingml/2006/main" xmlns:r="http://schemas.openxmlformats.org/officeDocument/2006/relationships" xmlns:p="http://schemas.openxmlformats.org/presentationml/2006/main">
+  <p:cSld>
+    <p:spTree>
+      <p:nvGrpSpPr>
+        <p:cNvPr id="1" name=""/>
+        <p:cNvGrpSpPr/>
+        <p:nvPr/>
+      </p:nvGrpSpPr>
+      <p:grpSpPr>
+        <a:xfrm>
+          <a:off x="0" y="0"/>
+          <a:ext cx="0" cy="0"/>
+          <a:chOff x="0" y="0"/>
+          <a:chExt cx="0" cy="0"/>
+        </a:xfrm>
+      </p:grpSpPr>
+      <p:sp>
+        <p:nvSpPr>
+          <p:cNvPr id="2" name="Title 1"/>
+          <p:cNvSpPr>
+            <a:spLocks noGrp="1"/>
+          </p:cNvSpPr>
+          <p:nvPr>
+            <p:ph type="title"/>
+          </p:nvPr>
+        </p:nvSpPr>
+        <p:spPr>
+          <a:gradFill flip="none" rotWithShape="1">
+            <a:gsLst>
+              <a:gs pos="0">
+                <a:schemeClr val="accent1">
+                  <a:tint val="66000"/>
+                  <a:satMod val="160000"/>
+                </a:schemeClr>
+              </a:gs>
+              <a:gs pos="50000">
+                <a:schemeClr val="accent1">
+                  <a:tint val="44500"/>
+                  <a:satMod val="160000"/>
+                </a:schemeClr>
+              </a:gs>
+              <a:gs pos="100000">
+                <a:schemeClr val="accent1">
+                  <a:tint val="23500"/>
+                  <a:satMod val="160000"/>
+                </a:schemeClr>
+              </a:gs>
+            </a:gsLst>
+            <a:lin ang="5400000" scaled="1"/>
+            <a:tileRect/>
+          </a:gradFill>
+        </p:spPr>
+        <p:txBody>
+          <a:bodyPr/>
+          <a:lstStyle/>
+          <a:p>
+            <a:pPr algn="ctr"/>
+            <a:r>
+              <a:rPr lang="en-US" dirty="0" smtClean="0"/>
+              <a:t>Scalability</a:t>
+            </a:r>
+            <a:endParaRPr lang="en-US" dirty="0"/>
+          </a:p>
+        </p:txBody>
+      </p:sp>
+      <p:sp>
+        <p:nvSpPr>
+          <p:cNvPr id="3" name="Content Placeholder 2"/>
+          <p:cNvSpPr>
+            <a:spLocks noGrp="1"/>
+          </p:cNvSpPr>
+          <p:nvPr>
+            <p:ph idx="1"/>
+          </p:nvPr>
+        </p:nvSpPr>
+        <p:spPr/>
+        <p:txBody>
+          <a:bodyPr>
+            <a:normAutofit/>
+          </a:bodyPr>
+          <a:lstStyle/>
+          <a:p>
+            <a:pPr algn="just">
+              <a:lnSpc>
+                <a:spcPct val="150000"/>
+              </a:lnSpc>
+            </a:pPr>
+            <a:r>
+              <a:rPr lang="en-US" sz="3200" dirty="0"/>
+              <a:t>Scalability is the property of a system to handle a growing amount of work by adding resources to the system</a:t>
+            </a:r>
+            <a:r>
+              <a:rPr lang="en-US" sz="3200" dirty="0" smtClean="0"/>
+              <a:t>.</a:t>
+            </a:r>
+          </a:p>
+          <a:p>
+            <a:pPr algn="just">
+              <a:lnSpc>
+                <a:spcPct val="150000"/>
+              </a:lnSpc>
+            </a:pPr>
+            <a:endParaRPr lang="en-US" sz="3200" dirty="0"/>
+          </a:p>
+          <a:p>
+            <a:pPr algn="just">
+              <a:lnSpc>
+                <a:spcPct val="150000"/>
+              </a:lnSpc>
+            </a:pPr>
+            <a:r>
+              <a:rPr lang="en-US" sz="3200" dirty="0"/>
+              <a:t>In computing, scalability is a characteristic of computers, networks, algorithms, </a:t>
+            </a:r>
+            <a:r>
+              <a:rPr lang="en-US" sz="3200" dirty="0" smtClean="0"/>
+              <a:t>protocols</a:t>
+            </a:r>
+            <a:r>
+              <a:rPr lang="en-US" sz="3200" dirty="0"/>
+              <a:t>, </a:t>
+            </a:r>
+            <a:r>
+              <a:rPr lang="en-US" sz="3200" dirty="0" smtClean="0"/>
+              <a:t>and </a:t>
+            </a:r>
+            <a:r>
+              <a:rPr lang="en-US" sz="3200" dirty="0"/>
+              <a:t>applications.</a:t>
+            </a:r>
+            <a:endParaRPr lang="en-US" sz="3200" dirty="0"/>
+          </a:p>
+        </p:txBody>
+      </p:sp>
+    </p:spTree>
+    <p:extLst>
+      <p:ext uri="{BB962C8B-B14F-4D97-AF65-F5344CB8AC3E}">
+        <p14:creationId xmlns:p14="http://schemas.microsoft.com/office/powerpoint/2010/main" val="3477004403"/>
+      </p:ext>
+    </p:extLst>
+  </p:cSld>
+  <p:clrMapOvr>
+    <a:masterClrMapping/>
+  </p:clrMapOvr>
+</p:sld>
+</file>
+
+<file path=ppt/slides/slide8.xml><?xml version="1.0" encoding="utf-8"?>
+<p:sld xmlns:a="http://schemas.openxmlformats.org/drawingml/2006/main" xmlns:r="http://schemas.openxmlformats.org/officeDocument/2006/relationships" xmlns:p="http://schemas.openxmlformats.org/presentationml/2006/main">
+  <p:cSld>
+    <p:spTree>
+      <p:nvGrpSpPr>
+        <p:cNvPr id="1" name=""/>
+        <p:cNvGrpSpPr/>
+        <p:nvPr/>
+      </p:nvGrpSpPr>
+      <p:grpSpPr>
+        <a:xfrm>
+          <a:off x="0" y="0"/>
+          <a:ext cx="0" cy="0"/>
+          <a:chOff x="0" y="0"/>
+          <a:chExt cx="0" cy="0"/>
+        </a:xfrm>
+      </p:grpSpPr>
+      <p:sp>
+        <p:nvSpPr>
+          <p:cNvPr id="2" name="Title 1"/>
+          <p:cNvSpPr>
+            <a:spLocks noGrp="1"/>
+          </p:cNvSpPr>
+          <p:nvPr>
+            <p:ph type="title"/>
+          </p:nvPr>
+        </p:nvSpPr>
+        <p:spPr>
+          <a:gradFill flip="none" rotWithShape="1">
+            <a:gsLst>
+              <a:gs pos="0">
+                <a:schemeClr val="accent1">
+                  <a:tint val="66000"/>
+                  <a:satMod val="160000"/>
+                </a:schemeClr>
+              </a:gs>
+              <a:gs pos="50000">
+                <a:schemeClr val="accent1">
+                  <a:tint val="44500"/>
+                  <a:satMod val="160000"/>
+                </a:schemeClr>
+              </a:gs>
+              <a:gs pos="100000">
+                <a:schemeClr val="accent1">
+                  <a:tint val="23500"/>
+                  <a:satMod val="160000"/>
+                </a:schemeClr>
+              </a:gs>
+            </a:gsLst>
+            <a:lin ang="5400000" scaled="1"/>
+            <a:tileRect/>
+          </a:gradFill>
+        </p:spPr>
+        <p:txBody>
+          <a:bodyPr/>
+          <a:lstStyle/>
+          <a:p>
+            <a:pPr algn="ctr"/>
+            <a:r>
+              <a:rPr lang="en-US" dirty="0" smtClean="0"/>
+              <a:t>Types of Scaling</a:t>
+            </a:r>
+            <a:endParaRPr lang="en-US" dirty="0"/>
+          </a:p>
+        </p:txBody>
+      </p:sp>
+      <p:sp>
+        <p:nvSpPr>
+          <p:cNvPr id="3" name="Content Placeholder 2"/>
+          <p:cNvSpPr>
+            <a:spLocks noGrp="1"/>
+          </p:cNvSpPr>
+          <p:nvPr>
+            <p:ph idx="1"/>
+          </p:nvPr>
+        </p:nvSpPr>
+        <p:spPr/>
+        <p:txBody>
+          <a:bodyPr>
+            <a:normAutofit/>
+          </a:bodyPr>
+          <a:lstStyle/>
+          <a:p>
+            <a:pPr algn="just">
+              <a:lnSpc>
+                <a:spcPct val="150000"/>
+              </a:lnSpc>
+            </a:pPr>
+            <a:r>
+              <a:rPr lang="en-US" sz="3200" dirty="0" smtClean="0"/>
+              <a:t>Vertical Scaling (Scaling Up)</a:t>
+            </a:r>
+          </a:p>
+          <a:p>
+            <a:pPr algn="just">
+              <a:lnSpc>
+                <a:spcPct val="150000"/>
+              </a:lnSpc>
+            </a:pPr>
+            <a:r>
+              <a:rPr lang="en-US" sz="3200" dirty="0" smtClean="0"/>
+              <a:t>Horizontal Scaling (Scaling Out)</a:t>
+            </a:r>
+            <a:endParaRPr lang="en-US" sz="3200" dirty="0"/>
+          </a:p>
+        </p:txBody>
+      </p:sp>
+    </p:spTree>
+    <p:extLst>
+      <p:ext uri="{BB962C8B-B14F-4D97-AF65-F5344CB8AC3E}">
+        <p14:creationId xmlns:p14="http://schemas.microsoft.com/office/powerpoint/2010/main" val="2079221393"/>
+      </p:ext>
+    </p:extLst>
+  </p:cSld>
+  <p:clrMapOvr>
+    <a:masterClrMapping/>
+  </p:clrMapOvr>
+</p:sld>
+</file>
+
+<file path=ppt/slides/slide9.xml><?xml version="1.0" encoding="utf-8"?>
+<p:sld xmlns:a="http://schemas.openxmlformats.org/drawingml/2006/main" xmlns:r="http://schemas.openxmlformats.org/officeDocument/2006/relationships" xmlns:p="http://schemas.openxmlformats.org/presentationml/2006/main">
+  <p:cSld>
+    <p:spTree>
+      <p:nvGrpSpPr>
+        <p:cNvPr id="1" name=""/>
+        <p:cNvGrpSpPr/>
+        <p:nvPr/>
+      </p:nvGrpSpPr>
+      <p:grpSpPr>
+        <a:xfrm>
+          <a:off x="0" y="0"/>
+          <a:ext cx="0" cy="0"/>
+          <a:chOff x="0" y="0"/>
+          <a:chExt cx="0" cy="0"/>
+        </a:xfrm>
+      </p:grpSpPr>
+      <p:sp>
+        <p:nvSpPr>
+          <p:cNvPr id="2" name="Title 1"/>
+          <p:cNvSpPr>
+            <a:spLocks noGrp="1"/>
+          </p:cNvSpPr>
+          <p:nvPr>
+            <p:ph type="title"/>
+          </p:nvPr>
+        </p:nvSpPr>
+        <p:spPr>
+          <a:gradFill flip="none" rotWithShape="1">
+            <a:gsLst>
+              <a:gs pos="0">
+                <a:schemeClr val="accent1">
+                  <a:tint val="66000"/>
+                  <a:satMod val="160000"/>
+                </a:schemeClr>
+              </a:gs>
+              <a:gs pos="50000">
+                <a:schemeClr val="accent1">
+                  <a:tint val="44500"/>
+                  <a:satMod val="160000"/>
+                </a:schemeClr>
+              </a:gs>
+              <a:gs pos="100000">
+                <a:schemeClr val="accent1">
+                  <a:tint val="23500"/>
+                  <a:satMod val="160000"/>
+                </a:schemeClr>
+              </a:gs>
+            </a:gsLst>
+            <a:lin ang="5400000" scaled="1"/>
+            <a:tileRect/>
+          </a:gradFill>
+        </p:spPr>
+        <p:txBody>
+          <a:bodyPr/>
+          <a:lstStyle/>
+          <a:p>
+            <a:pPr algn="ctr"/>
+            <a:r>
+              <a:rPr lang="en-US" dirty="0" smtClean="0"/>
+              <a:t>Vertical Scaling</a:t>
+            </a:r>
+            <a:endParaRPr lang="en-US" dirty="0"/>
+          </a:p>
+        </p:txBody>
+      </p:sp>
+      <p:sp>
+        <p:nvSpPr>
+          <p:cNvPr id="3" name="Content Placeholder 2"/>
+          <p:cNvSpPr>
+            <a:spLocks noGrp="1"/>
+          </p:cNvSpPr>
+          <p:nvPr>
+            <p:ph idx="1"/>
+          </p:nvPr>
+        </p:nvSpPr>
+        <p:spPr/>
+        <p:txBody>
+          <a:bodyPr>
+            <a:normAutofit/>
+          </a:bodyPr>
+          <a:lstStyle/>
+          <a:p>
+            <a:pPr marL="0" indent="0" algn="just">
+              <a:lnSpc>
+                <a:spcPct val="150000"/>
+              </a:lnSpc>
+              <a:buNone/>
+            </a:pPr>
+            <a:endParaRPr lang="en-US" sz="3200" dirty="0" smtClean="0"/>
+          </a:p>
+          <a:p>
+            <a:pPr algn="just">
+              <a:lnSpc>
+                <a:spcPct val="150000"/>
+              </a:lnSpc>
+            </a:pPr>
+            <a:r>
+              <a:rPr lang="en-US" sz="3200" dirty="0" smtClean="0"/>
+              <a:t>Vertical Scaling refers to scaling by adding more power (e.g. CPU, RAM) to an existing machine.</a:t>
+            </a:r>
+          </a:p>
+          <a:p>
+            <a:pPr algn="just">
+              <a:lnSpc>
+                <a:spcPct val="150000"/>
+              </a:lnSpc>
+            </a:pPr>
+            <a:endParaRPr lang="en-US" sz="3200" dirty="0"/>
+          </a:p>
+        </p:txBody>
+      </p:sp>
+    </p:spTree>
+    <p:extLst>
+      <p:ext uri="{BB962C8B-B14F-4D97-AF65-F5344CB8AC3E}">
+        <p14:creationId xmlns:p14="http://schemas.microsoft.com/office/powerpoint/2010/main" val="3038163771"/>
       </p:ext>
     </p:extLst>
   </p:cSld>

</xml_diff>

<commit_message>
Started the section on Database Sharding.
</commit_message>
<xml_diff>
--- a/Advanced DBMS Presentation.pptx
+++ b/Advanced DBMS Presentation.pptx
@@ -19,6 +19,15 @@
     <p:sldId id="267" r:id="rId13"/>
     <p:sldId id="268" r:id="rId14"/>
     <p:sldId id="269" r:id="rId15"/>
+    <p:sldId id="270" r:id="rId16"/>
+    <p:sldId id="271" r:id="rId17"/>
+    <p:sldId id="272" r:id="rId18"/>
+    <p:sldId id="273" r:id="rId19"/>
+    <p:sldId id="274" r:id="rId20"/>
+    <p:sldId id="275" r:id="rId21"/>
+    <p:sldId id="276" r:id="rId22"/>
+    <p:sldId id="277" r:id="rId23"/>
+    <p:sldId id="278" r:id="rId24"/>
   </p:sldIdLst>
   <p:sldSz cx="12192000" cy="6858000"/>
   <p:notesSz cx="6858000" cy="9144000"/>
@@ -256,7 +265,7 @@
           <a:p>
             <a:fld id="{D2D16D22-5ED1-465B-83E5-FE6CA2D3437B}" type="datetimeFigureOut">
               <a:rPr lang="en-US" smtClean="0"/>
-              <a:t>5/28/2021</a:t>
+              <a:t>5/29/2021</a:t>
             </a:fld>
             <a:endParaRPr lang="en-US"/>
           </a:p>
@@ -426,7 +435,7 @@
           <a:p>
             <a:fld id="{D2D16D22-5ED1-465B-83E5-FE6CA2D3437B}" type="datetimeFigureOut">
               <a:rPr lang="en-US" smtClean="0"/>
-              <a:t>5/28/2021</a:t>
+              <a:t>5/29/2021</a:t>
             </a:fld>
             <a:endParaRPr lang="en-US"/>
           </a:p>
@@ -606,7 +615,7 @@
           <a:p>
             <a:fld id="{D2D16D22-5ED1-465B-83E5-FE6CA2D3437B}" type="datetimeFigureOut">
               <a:rPr lang="en-US" smtClean="0"/>
-              <a:t>5/28/2021</a:t>
+              <a:t>5/29/2021</a:t>
             </a:fld>
             <a:endParaRPr lang="en-US"/>
           </a:p>
@@ -776,7 +785,7 @@
           <a:p>
             <a:fld id="{D2D16D22-5ED1-465B-83E5-FE6CA2D3437B}" type="datetimeFigureOut">
               <a:rPr lang="en-US" smtClean="0"/>
-              <a:t>5/28/2021</a:t>
+              <a:t>5/29/2021</a:t>
             </a:fld>
             <a:endParaRPr lang="en-US"/>
           </a:p>
@@ -1022,7 +1031,7 @@
           <a:p>
             <a:fld id="{D2D16D22-5ED1-465B-83E5-FE6CA2D3437B}" type="datetimeFigureOut">
               <a:rPr lang="en-US" smtClean="0"/>
-              <a:t>5/28/2021</a:t>
+              <a:t>5/29/2021</a:t>
             </a:fld>
             <a:endParaRPr lang="en-US"/>
           </a:p>
@@ -1254,7 +1263,7 @@
           <a:p>
             <a:fld id="{D2D16D22-5ED1-465B-83E5-FE6CA2D3437B}" type="datetimeFigureOut">
               <a:rPr lang="en-US" smtClean="0"/>
-              <a:t>5/28/2021</a:t>
+              <a:t>5/29/2021</a:t>
             </a:fld>
             <a:endParaRPr lang="en-US"/>
           </a:p>
@@ -1621,7 +1630,7 @@
           <a:p>
             <a:fld id="{D2D16D22-5ED1-465B-83E5-FE6CA2D3437B}" type="datetimeFigureOut">
               <a:rPr lang="en-US" smtClean="0"/>
-              <a:t>5/28/2021</a:t>
+              <a:t>5/29/2021</a:t>
             </a:fld>
             <a:endParaRPr lang="en-US"/>
           </a:p>
@@ -1739,7 +1748,7 @@
           <a:p>
             <a:fld id="{D2D16D22-5ED1-465B-83E5-FE6CA2D3437B}" type="datetimeFigureOut">
               <a:rPr lang="en-US" smtClean="0"/>
-              <a:t>5/28/2021</a:t>
+              <a:t>5/29/2021</a:t>
             </a:fld>
             <a:endParaRPr lang="en-US"/>
           </a:p>
@@ -1834,7 +1843,7 @@
           <a:p>
             <a:fld id="{D2D16D22-5ED1-465B-83E5-FE6CA2D3437B}" type="datetimeFigureOut">
               <a:rPr lang="en-US" smtClean="0"/>
-              <a:t>5/28/2021</a:t>
+              <a:t>5/29/2021</a:t>
             </a:fld>
             <a:endParaRPr lang="en-US"/>
           </a:p>
@@ -2111,7 +2120,7 @@
           <a:p>
             <a:fld id="{D2D16D22-5ED1-465B-83E5-FE6CA2D3437B}" type="datetimeFigureOut">
               <a:rPr lang="en-US" smtClean="0"/>
-              <a:t>5/28/2021</a:t>
+              <a:t>5/29/2021</a:t>
             </a:fld>
             <a:endParaRPr lang="en-US"/>
           </a:p>
@@ -2364,7 +2373,7 @@
           <a:p>
             <a:fld id="{D2D16D22-5ED1-465B-83E5-FE6CA2D3437B}" type="datetimeFigureOut">
               <a:rPr lang="en-US" smtClean="0"/>
-              <a:t>5/28/2021</a:t>
+              <a:t>5/29/2021</a:t>
             </a:fld>
             <a:endParaRPr lang="en-US"/>
           </a:p>
@@ -2577,7 +2586,7 @@
           <a:p>
             <a:fld id="{D2D16D22-5ED1-465B-83E5-FE6CA2D3437B}" type="datetimeFigureOut">
               <a:rPr lang="en-US" smtClean="0"/>
-              <a:t>5/28/2021</a:t>
+              <a:t>5/29/2021</a:t>
             </a:fld>
             <a:endParaRPr lang="en-US"/>
           </a:p>
@@ -3154,7 +3163,6 @@
               <a:rPr lang="en-US" sz="3200" dirty="0"/>
               <a:t>Vertical scaling is limited to the capacity of one machine, scaling beyond that capacity can involve downtime and has an upper hard limit, i.e. the scale of the hardware on which you are currently running.</a:t>
             </a:r>
-            <a:endParaRPr lang="en-US" sz="3200" dirty="0"/>
           </a:p>
         </p:txBody>
       </p:sp>
@@ -3388,7 +3396,6 @@
               <a:rPr lang="en-US" sz="3200" dirty="0"/>
               <a:t>In theory, adding more machines to the existing pool means you are not limited to the capacity of a single unit, making it possible to scale with less downtime.</a:t>
             </a:r>
-            <a:endParaRPr lang="en-US" sz="3200" dirty="0"/>
           </a:p>
         </p:txBody>
       </p:sp>
@@ -3513,7 +3520,6 @@
               <a:rPr lang="en-US" sz="3200" dirty="0"/>
               <a:t>so that they can be executed in parallel across multiple machines.</a:t>
             </a:r>
-            <a:endParaRPr lang="en-US" sz="3200" dirty="0"/>
           </a:p>
         </p:txBody>
       </p:sp>
@@ -3622,7 +3628,6 @@
               <a:rPr lang="en-US" sz="3200" dirty="0"/>
               <a:t>In many respects, vertical scaling is easier because the logic really doesn’t need to change. Rather, you’re just running the same code on higher-spec machines.</a:t>
             </a:r>
-            <a:endParaRPr lang="en-US" sz="3200" dirty="0"/>
           </a:p>
         </p:txBody>
       </p:sp>
@@ -3630,6 +3635,579 @@
     <p:extLst>
       <p:ext uri="{BB962C8B-B14F-4D97-AF65-F5344CB8AC3E}">
         <p14:creationId xmlns:p14="http://schemas.microsoft.com/office/powerpoint/2010/main" val="3728352779"/>
+      </p:ext>
+    </p:extLst>
+  </p:cSld>
+  <p:clrMapOvr>
+    <a:masterClrMapping/>
+  </p:clrMapOvr>
+</p:sld>
+</file>
+
+<file path=ppt/slides/slide15.xml><?xml version="1.0" encoding="utf-8"?>
+<p:sld xmlns:a="http://schemas.openxmlformats.org/drawingml/2006/main" xmlns:r="http://schemas.openxmlformats.org/officeDocument/2006/relationships" xmlns:p="http://schemas.openxmlformats.org/presentationml/2006/main">
+  <p:cSld>
+    <p:spTree>
+      <p:nvGrpSpPr>
+        <p:cNvPr id="1" name=""/>
+        <p:cNvGrpSpPr/>
+        <p:nvPr/>
+      </p:nvGrpSpPr>
+      <p:grpSpPr>
+        <a:xfrm>
+          <a:off x="0" y="0"/>
+          <a:ext cx="0" cy="0"/>
+          <a:chOff x="0" y="0"/>
+          <a:chExt cx="0" cy="0"/>
+        </a:xfrm>
+      </p:grpSpPr>
+      <p:sp>
+        <p:nvSpPr>
+          <p:cNvPr id="2" name="Title 1"/>
+          <p:cNvSpPr>
+            <a:spLocks noGrp="1"/>
+          </p:cNvSpPr>
+          <p:nvPr>
+            <p:ph type="title"/>
+          </p:nvPr>
+        </p:nvSpPr>
+        <p:spPr>
+          <a:gradFill flip="none" rotWithShape="1">
+            <a:gsLst>
+              <a:gs pos="0">
+                <a:schemeClr val="accent1">
+                  <a:tint val="66000"/>
+                  <a:satMod val="160000"/>
+                </a:schemeClr>
+              </a:gs>
+              <a:gs pos="50000">
+                <a:schemeClr val="accent1">
+                  <a:tint val="44500"/>
+                  <a:satMod val="160000"/>
+                </a:schemeClr>
+              </a:gs>
+              <a:gs pos="100000">
+                <a:schemeClr val="accent1">
+                  <a:tint val="23500"/>
+                  <a:satMod val="160000"/>
+                </a:schemeClr>
+              </a:gs>
+            </a:gsLst>
+            <a:lin ang="5400000" scaled="1"/>
+            <a:tileRect/>
+          </a:gradFill>
+        </p:spPr>
+        <p:txBody>
+          <a:bodyPr/>
+          <a:lstStyle/>
+          <a:p>
+            <a:pPr algn="ctr"/>
+            <a:r>
+              <a:rPr lang="en-US" dirty="0" smtClean="0"/>
+              <a:t>Types of Scaling</a:t>
+            </a:r>
+            <a:endParaRPr lang="en-US" dirty="0"/>
+          </a:p>
+        </p:txBody>
+      </p:sp>
+      <p:pic>
+        <p:nvPicPr>
+          <p:cNvPr id="5" name="Picture 4"/>
+          <p:cNvPicPr>
+            <a:picLocks noChangeAspect="1"/>
+          </p:cNvPicPr>
+          <p:nvPr/>
+        </p:nvPicPr>
+        <p:blipFill>
+          <a:blip r:embed="rId2">
+            <a:extLst>
+              <a:ext uri="{28A0092B-C50C-407E-A947-70E740481C1C}">
+                <a14:useLocalDpi xmlns:a14="http://schemas.microsoft.com/office/drawing/2010/main" val="0"/>
+              </a:ext>
+            </a:extLst>
+          </a:blip>
+          <a:stretch>
+            <a:fillRect/>
+          </a:stretch>
+        </p:blipFill>
+        <p:spPr>
+          <a:xfrm>
+            <a:off x="1066800" y="1792721"/>
+            <a:ext cx="10058400" cy="4353635"/>
+          </a:xfrm>
+          <a:prstGeom prst="rect">
+            <a:avLst/>
+          </a:prstGeom>
+        </p:spPr>
+      </p:pic>
+    </p:spTree>
+    <p:extLst>
+      <p:ext uri="{BB962C8B-B14F-4D97-AF65-F5344CB8AC3E}">
+        <p14:creationId xmlns:p14="http://schemas.microsoft.com/office/powerpoint/2010/main" val="731500437"/>
+      </p:ext>
+    </p:extLst>
+  </p:cSld>
+  <p:clrMapOvr>
+    <a:masterClrMapping/>
+  </p:clrMapOvr>
+</p:sld>
+</file>
+
+<file path=ppt/slides/slide16.xml><?xml version="1.0" encoding="utf-8"?>
+<p:sld xmlns:a="http://schemas.openxmlformats.org/drawingml/2006/main" xmlns:r="http://schemas.openxmlformats.org/officeDocument/2006/relationships" xmlns:p="http://schemas.openxmlformats.org/presentationml/2006/main">
+  <p:cSld>
+    <p:spTree>
+      <p:nvGrpSpPr>
+        <p:cNvPr id="1" name=""/>
+        <p:cNvGrpSpPr/>
+        <p:nvPr/>
+      </p:nvGrpSpPr>
+      <p:grpSpPr>
+        <a:xfrm>
+          <a:off x="0" y="0"/>
+          <a:ext cx="0" cy="0"/>
+          <a:chOff x="0" y="0"/>
+          <a:chExt cx="0" cy="0"/>
+        </a:xfrm>
+      </p:grpSpPr>
+      <p:sp>
+        <p:nvSpPr>
+          <p:cNvPr id="2" name="Title 1"/>
+          <p:cNvSpPr>
+            <a:spLocks noGrp="1"/>
+          </p:cNvSpPr>
+          <p:nvPr>
+            <p:ph type="title"/>
+          </p:nvPr>
+        </p:nvSpPr>
+        <p:spPr>
+          <a:gradFill flip="none" rotWithShape="1">
+            <a:gsLst>
+              <a:gs pos="0">
+                <a:schemeClr val="accent1">
+                  <a:tint val="66000"/>
+                  <a:satMod val="160000"/>
+                </a:schemeClr>
+              </a:gs>
+              <a:gs pos="50000">
+                <a:schemeClr val="accent1">
+                  <a:tint val="44500"/>
+                  <a:satMod val="160000"/>
+                </a:schemeClr>
+              </a:gs>
+              <a:gs pos="100000">
+                <a:schemeClr val="accent1">
+                  <a:tint val="23500"/>
+                  <a:satMod val="160000"/>
+                </a:schemeClr>
+              </a:gs>
+            </a:gsLst>
+            <a:lin ang="5400000" scaled="1"/>
+            <a:tileRect/>
+          </a:gradFill>
+        </p:spPr>
+        <p:txBody>
+          <a:bodyPr/>
+          <a:lstStyle/>
+          <a:p>
+            <a:pPr algn="ctr"/>
+            <a:r>
+              <a:rPr lang="en-US" dirty="0" smtClean="0"/>
+              <a:t>Scalability</a:t>
+            </a:r>
+            <a:endParaRPr lang="en-US" dirty="0"/>
+          </a:p>
+        </p:txBody>
+      </p:sp>
+      <p:sp>
+        <p:nvSpPr>
+          <p:cNvPr id="3" name="Content Placeholder 2"/>
+          <p:cNvSpPr>
+            <a:spLocks noGrp="1"/>
+          </p:cNvSpPr>
+          <p:nvPr>
+            <p:ph idx="1"/>
+          </p:nvPr>
+        </p:nvSpPr>
+        <p:spPr/>
+        <p:txBody>
+          <a:bodyPr>
+            <a:normAutofit/>
+          </a:bodyPr>
+          <a:lstStyle/>
+          <a:p>
+            <a:pPr algn="just">
+              <a:lnSpc>
+                <a:spcPct val="150000"/>
+              </a:lnSpc>
+            </a:pPr>
+            <a:r>
+              <a:rPr lang="en-US" sz="3200" dirty="0"/>
+              <a:t>Any application or website that sees significant growth will eventually need to scale in order to accommodate increases in traffic. For data-driven applications and websites, it’s critical that scaling is done in a way that ensures the security and integrity of their data. </a:t>
+            </a:r>
+            <a:endParaRPr lang="en-US" sz="3200" dirty="0"/>
+          </a:p>
+        </p:txBody>
+      </p:sp>
+    </p:spTree>
+    <p:extLst>
+      <p:ext uri="{BB962C8B-B14F-4D97-AF65-F5344CB8AC3E}">
+        <p14:creationId xmlns:p14="http://schemas.microsoft.com/office/powerpoint/2010/main" val="2756324781"/>
+      </p:ext>
+    </p:extLst>
+  </p:cSld>
+  <p:clrMapOvr>
+    <a:masterClrMapping/>
+  </p:clrMapOvr>
+</p:sld>
+</file>
+
+<file path=ppt/slides/slide17.xml><?xml version="1.0" encoding="utf-8"?>
+<p:sld xmlns:a="http://schemas.openxmlformats.org/drawingml/2006/main" xmlns:r="http://schemas.openxmlformats.org/officeDocument/2006/relationships" xmlns:p="http://schemas.openxmlformats.org/presentationml/2006/main">
+  <p:cSld>
+    <p:spTree>
+      <p:nvGrpSpPr>
+        <p:cNvPr id="1" name=""/>
+        <p:cNvGrpSpPr/>
+        <p:nvPr/>
+      </p:nvGrpSpPr>
+      <p:grpSpPr>
+        <a:xfrm>
+          <a:off x="0" y="0"/>
+          <a:ext cx="0" cy="0"/>
+          <a:chOff x="0" y="0"/>
+          <a:chExt cx="0" cy="0"/>
+        </a:xfrm>
+      </p:grpSpPr>
+      <p:sp>
+        <p:nvSpPr>
+          <p:cNvPr id="2" name="Title 1"/>
+          <p:cNvSpPr>
+            <a:spLocks noGrp="1"/>
+          </p:cNvSpPr>
+          <p:nvPr>
+            <p:ph type="title"/>
+          </p:nvPr>
+        </p:nvSpPr>
+        <p:spPr>
+          <a:gradFill flip="none" rotWithShape="1">
+            <a:gsLst>
+              <a:gs pos="0">
+                <a:schemeClr val="accent1">
+                  <a:tint val="66000"/>
+                  <a:satMod val="160000"/>
+                </a:schemeClr>
+              </a:gs>
+              <a:gs pos="50000">
+                <a:schemeClr val="accent1">
+                  <a:tint val="44500"/>
+                  <a:satMod val="160000"/>
+                </a:schemeClr>
+              </a:gs>
+              <a:gs pos="100000">
+                <a:schemeClr val="accent1">
+                  <a:tint val="23500"/>
+                  <a:satMod val="160000"/>
+                </a:schemeClr>
+              </a:gs>
+            </a:gsLst>
+            <a:lin ang="5400000" scaled="1"/>
+            <a:tileRect/>
+          </a:gradFill>
+        </p:spPr>
+        <p:txBody>
+          <a:bodyPr/>
+          <a:lstStyle/>
+          <a:p>
+            <a:pPr algn="ctr"/>
+            <a:r>
+              <a:rPr lang="en-US" dirty="0" smtClean="0"/>
+              <a:t>Scalability</a:t>
+            </a:r>
+            <a:endParaRPr lang="en-US" dirty="0"/>
+          </a:p>
+        </p:txBody>
+      </p:sp>
+      <p:sp>
+        <p:nvSpPr>
+          <p:cNvPr id="3" name="Content Placeholder 2"/>
+          <p:cNvSpPr>
+            <a:spLocks noGrp="1"/>
+          </p:cNvSpPr>
+          <p:nvPr>
+            <p:ph idx="1"/>
+          </p:nvPr>
+        </p:nvSpPr>
+        <p:spPr/>
+        <p:txBody>
+          <a:bodyPr>
+            <a:normAutofit/>
+          </a:bodyPr>
+          <a:lstStyle/>
+          <a:p>
+            <a:pPr algn="just">
+              <a:lnSpc>
+                <a:spcPct val="150000"/>
+              </a:lnSpc>
+            </a:pPr>
+            <a:r>
+              <a:rPr lang="en-US" sz="3200" dirty="0"/>
+              <a:t>It can be difficult to predict how popular a website or application will become or how long it will maintain that popularity, which is why some organizations choose a database architecture that allows them to scale their databases dynamically.</a:t>
+            </a:r>
+            <a:endParaRPr lang="en-US" sz="3200" dirty="0"/>
+          </a:p>
+        </p:txBody>
+      </p:sp>
+    </p:spTree>
+    <p:extLst>
+      <p:ext uri="{BB962C8B-B14F-4D97-AF65-F5344CB8AC3E}">
+        <p14:creationId xmlns:p14="http://schemas.microsoft.com/office/powerpoint/2010/main" val="3795751291"/>
+      </p:ext>
+    </p:extLst>
+  </p:cSld>
+  <p:clrMapOvr>
+    <a:masterClrMapping/>
+  </p:clrMapOvr>
+</p:sld>
+</file>
+
+<file path=ppt/slides/slide18.xml><?xml version="1.0" encoding="utf-8"?>
+<p:sld xmlns:a="http://schemas.openxmlformats.org/drawingml/2006/main" xmlns:r="http://schemas.openxmlformats.org/officeDocument/2006/relationships" xmlns:p="http://schemas.openxmlformats.org/presentationml/2006/main">
+  <p:cSld>
+    <p:spTree>
+      <p:nvGrpSpPr>
+        <p:cNvPr id="1" name=""/>
+        <p:cNvGrpSpPr/>
+        <p:nvPr/>
+      </p:nvGrpSpPr>
+      <p:grpSpPr>
+        <a:xfrm>
+          <a:off x="0" y="0"/>
+          <a:ext cx="0" cy="0"/>
+          <a:chOff x="0" y="0"/>
+          <a:chExt cx="0" cy="0"/>
+        </a:xfrm>
+      </p:grpSpPr>
+      <p:sp>
+        <p:nvSpPr>
+          <p:cNvPr id="2" name="Title 1"/>
+          <p:cNvSpPr>
+            <a:spLocks noGrp="1"/>
+          </p:cNvSpPr>
+          <p:nvPr>
+            <p:ph type="title"/>
+          </p:nvPr>
+        </p:nvSpPr>
+        <p:spPr>
+          <a:gradFill flip="none" rotWithShape="1">
+            <a:gsLst>
+              <a:gs pos="0">
+                <a:schemeClr val="accent1">
+                  <a:tint val="66000"/>
+                  <a:satMod val="160000"/>
+                </a:schemeClr>
+              </a:gs>
+              <a:gs pos="50000">
+                <a:schemeClr val="accent1">
+                  <a:tint val="44500"/>
+                  <a:satMod val="160000"/>
+                </a:schemeClr>
+              </a:gs>
+              <a:gs pos="100000">
+                <a:schemeClr val="accent1">
+                  <a:tint val="23500"/>
+                  <a:satMod val="160000"/>
+                </a:schemeClr>
+              </a:gs>
+            </a:gsLst>
+            <a:lin ang="5400000" scaled="1"/>
+            <a:tileRect/>
+          </a:gradFill>
+        </p:spPr>
+        <p:txBody>
+          <a:bodyPr/>
+          <a:lstStyle/>
+          <a:p>
+            <a:pPr algn="ctr"/>
+            <a:r>
+              <a:rPr lang="en-US" dirty="0" smtClean="0"/>
+              <a:t>Database </a:t>
+            </a:r>
+            <a:r>
+              <a:rPr lang="en-US" dirty="0" err="1" smtClean="0"/>
+              <a:t>Sharding</a:t>
+            </a:r>
+            <a:endParaRPr lang="en-US" dirty="0"/>
+          </a:p>
+        </p:txBody>
+      </p:sp>
+      <p:sp>
+        <p:nvSpPr>
+          <p:cNvPr id="3" name="Content Placeholder 2"/>
+          <p:cNvSpPr>
+            <a:spLocks noGrp="1"/>
+          </p:cNvSpPr>
+          <p:nvPr>
+            <p:ph idx="1"/>
+          </p:nvPr>
+        </p:nvSpPr>
+        <p:spPr/>
+        <p:txBody>
+          <a:bodyPr>
+            <a:normAutofit/>
+          </a:bodyPr>
+          <a:lstStyle/>
+          <a:p>
+            <a:pPr algn="just">
+              <a:lnSpc>
+                <a:spcPct val="150000"/>
+              </a:lnSpc>
+            </a:pPr>
+            <a:r>
+              <a:rPr lang="en-US" sz="3200" dirty="0" err="1"/>
+              <a:t>Sharding</a:t>
+            </a:r>
+            <a:r>
+              <a:rPr lang="en-US" sz="3200" dirty="0"/>
+              <a:t> is a database architecture pattern related to horizontal </a:t>
+            </a:r>
+            <a:r>
+              <a:rPr lang="en-US" sz="3200" dirty="0" smtClean="0"/>
+              <a:t>scaling, </a:t>
+            </a:r>
+            <a:r>
+              <a:rPr lang="en-US" sz="3200" dirty="0"/>
+              <a:t>the practice of separating one table’s rows into multiple different tables, known as partitions.</a:t>
+            </a:r>
+            <a:endParaRPr lang="en-US" sz="3200" dirty="0"/>
+          </a:p>
+        </p:txBody>
+      </p:sp>
+    </p:spTree>
+    <p:extLst>
+      <p:ext uri="{BB962C8B-B14F-4D97-AF65-F5344CB8AC3E}">
+        <p14:creationId xmlns:p14="http://schemas.microsoft.com/office/powerpoint/2010/main" val="650582187"/>
+      </p:ext>
+    </p:extLst>
+  </p:cSld>
+  <p:clrMapOvr>
+    <a:masterClrMapping/>
+  </p:clrMapOvr>
+</p:sld>
+</file>
+
+<file path=ppt/slides/slide19.xml><?xml version="1.0" encoding="utf-8"?>
+<p:sld xmlns:a="http://schemas.openxmlformats.org/drawingml/2006/main" xmlns:r="http://schemas.openxmlformats.org/officeDocument/2006/relationships" xmlns:p="http://schemas.openxmlformats.org/presentationml/2006/main">
+  <p:cSld>
+    <p:spTree>
+      <p:nvGrpSpPr>
+        <p:cNvPr id="1" name=""/>
+        <p:cNvGrpSpPr/>
+        <p:nvPr/>
+      </p:nvGrpSpPr>
+      <p:grpSpPr>
+        <a:xfrm>
+          <a:off x="0" y="0"/>
+          <a:ext cx="0" cy="0"/>
+          <a:chOff x="0" y="0"/>
+          <a:chExt cx="0" cy="0"/>
+        </a:xfrm>
+      </p:grpSpPr>
+      <p:sp>
+        <p:nvSpPr>
+          <p:cNvPr id="2" name="Title 1"/>
+          <p:cNvSpPr>
+            <a:spLocks noGrp="1"/>
+          </p:cNvSpPr>
+          <p:nvPr>
+            <p:ph type="title"/>
+          </p:nvPr>
+        </p:nvSpPr>
+        <p:spPr>
+          <a:gradFill flip="none" rotWithShape="1">
+            <a:gsLst>
+              <a:gs pos="0">
+                <a:schemeClr val="accent1">
+                  <a:tint val="66000"/>
+                  <a:satMod val="160000"/>
+                </a:schemeClr>
+              </a:gs>
+              <a:gs pos="50000">
+                <a:schemeClr val="accent1">
+                  <a:tint val="44500"/>
+                  <a:satMod val="160000"/>
+                </a:schemeClr>
+              </a:gs>
+              <a:gs pos="100000">
+                <a:schemeClr val="accent1">
+                  <a:tint val="23500"/>
+                  <a:satMod val="160000"/>
+                </a:schemeClr>
+              </a:gs>
+            </a:gsLst>
+            <a:lin ang="5400000" scaled="1"/>
+            <a:tileRect/>
+          </a:gradFill>
+        </p:spPr>
+        <p:txBody>
+          <a:bodyPr/>
+          <a:lstStyle/>
+          <a:p>
+            <a:pPr algn="ctr"/>
+            <a:r>
+              <a:rPr lang="en-US" dirty="0" smtClean="0"/>
+              <a:t>Database </a:t>
+            </a:r>
+            <a:r>
+              <a:rPr lang="en-US" dirty="0" err="1" smtClean="0"/>
+              <a:t>Sharding</a:t>
+            </a:r>
+            <a:endParaRPr lang="en-US" dirty="0"/>
+          </a:p>
+        </p:txBody>
+      </p:sp>
+      <p:sp>
+        <p:nvSpPr>
+          <p:cNvPr id="3" name="Content Placeholder 2"/>
+          <p:cNvSpPr>
+            <a:spLocks noGrp="1"/>
+          </p:cNvSpPr>
+          <p:nvPr>
+            <p:ph idx="1"/>
+          </p:nvPr>
+        </p:nvSpPr>
+        <p:spPr/>
+        <p:txBody>
+          <a:bodyPr>
+            <a:normAutofit/>
+          </a:bodyPr>
+          <a:lstStyle/>
+          <a:p>
+            <a:pPr algn="just">
+              <a:lnSpc>
+                <a:spcPct val="150000"/>
+              </a:lnSpc>
+            </a:pPr>
+            <a:r>
+              <a:rPr lang="en-US" sz="3200" dirty="0"/>
+              <a:t>Each partition has the same schema and columns, but also entirely different rows. Likewise, the data held in </a:t>
+            </a:r>
+            <a:r>
+              <a:rPr lang="en-US" sz="3200" dirty="0" smtClean="0"/>
+              <a:t>each partition </a:t>
+            </a:r>
+            <a:r>
+              <a:rPr lang="en-US" sz="3200" dirty="0"/>
+              <a:t>is unique and independent of the data held in other partitions.</a:t>
+            </a:r>
+            <a:endParaRPr lang="en-US" sz="3200" dirty="0"/>
+          </a:p>
+        </p:txBody>
+      </p:sp>
+    </p:spTree>
+    <p:extLst>
+      <p:ext uri="{BB962C8B-B14F-4D97-AF65-F5344CB8AC3E}">
+        <p14:creationId xmlns:p14="http://schemas.microsoft.com/office/powerpoint/2010/main" val="1762941472"/>
       </p:ext>
     </p:extLst>
   </p:cSld>
@@ -3750,6 +4328,466 @@
     <p:extLst>
       <p:ext uri="{BB962C8B-B14F-4D97-AF65-F5344CB8AC3E}">
         <p14:creationId xmlns:p14="http://schemas.microsoft.com/office/powerpoint/2010/main" val="910449758"/>
+      </p:ext>
+    </p:extLst>
+  </p:cSld>
+  <p:clrMapOvr>
+    <a:masterClrMapping/>
+  </p:clrMapOvr>
+</p:sld>
+</file>
+
+<file path=ppt/slides/slide20.xml><?xml version="1.0" encoding="utf-8"?>
+<p:sld xmlns:a="http://schemas.openxmlformats.org/drawingml/2006/main" xmlns:r="http://schemas.openxmlformats.org/officeDocument/2006/relationships" xmlns:p="http://schemas.openxmlformats.org/presentationml/2006/main">
+  <p:cSld>
+    <p:spTree>
+      <p:nvGrpSpPr>
+        <p:cNvPr id="1" name=""/>
+        <p:cNvGrpSpPr/>
+        <p:nvPr/>
+      </p:nvGrpSpPr>
+      <p:grpSpPr>
+        <a:xfrm>
+          <a:off x="0" y="0"/>
+          <a:ext cx="0" cy="0"/>
+          <a:chOff x="0" y="0"/>
+          <a:chExt cx="0" cy="0"/>
+        </a:xfrm>
+      </p:grpSpPr>
+      <p:sp>
+        <p:nvSpPr>
+          <p:cNvPr id="2" name="Title 1"/>
+          <p:cNvSpPr>
+            <a:spLocks noGrp="1"/>
+          </p:cNvSpPr>
+          <p:nvPr>
+            <p:ph type="title"/>
+          </p:nvPr>
+        </p:nvSpPr>
+        <p:spPr>
+          <a:gradFill flip="none" rotWithShape="1">
+            <a:gsLst>
+              <a:gs pos="0">
+                <a:schemeClr val="accent1">
+                  <a:tint val="66000"/>
+                  <a:satMod val="160000"/>
+                </a:schemeClr>
+              </a:gs>
+              <a:gs pos="50000">
+                <a:schemeClr val="accent1">
+                  <a:tint val="44500"/>
+                  <a:satMod val="160000"/>
+                </a:schemeClr>
+              </a:gs>
+              <a:gs pos="100000">
+                <a:schemeClr val="accent1">
+                  <a:tint val="23500"/>
+                  <a:satMod val="160000"/>
+                </a:schemeClr>
+              </a:gs>
+            </a:gsLst>
+            <a:lin ang="5400000" scaled="1"/>
+            <a:tileRect/>
+          </a:gradFill>
+        </p:spPr>
+        <p:txBody>
+          <a:bodyPr/>
+          <a:lstStyle/>
+          <a:p>
+            <a:pPr algn="ctr"/>
+            <a:r>
+              <a:rPr lang="en-US" dirty="0" smtClean="0"/>
+              <a:t>Database </a:t>
+            </a:r>
+            <a:r>
+              <a:rPr lang="en-US" dirty="0" err="1" smtClean="0"/>
+              <a:t>Sharding</a:t>
+            </a:r>
+            <a:endParaRPr lang="en-US" dirty="0"/>
+          </a:p>
+        </p:txBody>
+      </p:sp>
+      <p:pic>
+        <p:nvPicPr>
+          <p:cNvPr id="5" name="Picture 4"/>
+          <p:cNvPicPr>
+            <a:picLocks noChangeAspect="1"/>
+          </p:cNvPicPr>
+          <p:nvPr/>
+        </p:nvPicPr>
+        <p:blipFill>
+          <a:blip r:embed="rId2" cstate="print">
+            <a:extLst>
+              <a:ext uri="{28A0092B-C50C-407E-A947-70E740481C1C}">
+                <a14:useLocalDpi xmlns:a14="http://schemas.microsoft.com/office/drawing/2010/main" val="0"/>
+              </a:ext>
+            </a:extLst>
+          </a:blip>
+          <a:stretch>
+            <a:fillRect/>
+          </a:stretch>
+        </p:blipFill>
+        <p:spPr>
+          <a:xfrm>
+            <a:off x="2973690" y="1924030"/>
+            <a:ext cx="6244620" cy="4518333"/>
+          </a:xfrm>
+          <a:prstGeom prst="rect">
+            <a:avLst/>
+          </a:prstGeom>
+        </p:spPr>
+      </p:pic>
+    </p:spTree>
+    <p:extLst>
+      <p:ext uri="{BB962C8B-B14F-4D97-AF65-F5344CB8AC3E}">
+        <p14:creationId xmlns:p14="http://schemas.microsoft.com/office/powerpoint/2010/main" val="1356562707"/>
+      </p:ext>
+    </p:extLst>
+  </p:cSld>
+  <p:clrMapOvr>
+    <a:masterClrMapping/>
+  </p:clrMapOvr>
+</p:sld>
+</file>
+
+<file path=ppt/slides/slide21.xml><?xml version="1.0" encoding="utf-8"?>
+<p:sld xmlns:a="http://schemas.openxmlformats.org/drawingml/2006/main" xmlns:r="http://schemas.openxmlformats.org/officeDocument/2006/relationships" xmlns:p="http://schemas.openxmlformats.org/presentationml/2006/main">
+  <p:cSld>
+    <p:spTree>
+      <p:nvGrpSpPr>
+        <p:cNvPr id="1" name=""/>
+        <p:cNvGrpSpPr/>
+        <p:nvPr/>
+      </p:nvGrpSpPr>
+      <p:grpSpPr>
+        <a:xfrm>
+          <a:off x="0" y="0"/>
+          <a:ext cx="0" cy="0"/>
+          <a:chOff x="0" y="0"/>
+          <a:chExt cx="0" cy="0"/>
+        </a:xfrm>
+      </p:grpSpPr>
+      <p:sp>
+        <p:nvSpPr>
+          <p:cNvPr id="2" name="Title 1"/>
+          <p:cNvSpPr>
+            <a:spLocks noGrp="1"/>
+          </p:cNvSpPr>
+          <p:nvPr>
+            <p:ph type="title"/>
+          </p:nvPr>
+        </p:nvSpPr>
+        <p:spPr>
+          <a:gradFill flip="none" rotWithShape="1">
+            <a:gsLst>
+              <a:gs pos="0">
+                <a:schemeClr val="accent1">
+                  <a:tint val="66000"/>
+                  <a:satMod val="160000"/>
+                </a:schemeClr>
+              </a:gs>
+              <a:gs pos="50000">
+                <a:schemeClr val="accent1">
+                  <a:tint val="44500"/>
+                  <a:satMod val="160000"/>
+                </a:schemeClr>
+              </a:gs>
+              <a:gs pos="100000">
+                <a:schemeClr val="accent1">
+                  <a:tint val="23500"/>
+                  <a:satMod val="160000"/>
+                </a:schemeClr>
+              </a:gs>
+            </a:gsLst>
+            <a:lin ang="5400000" scaled="1"/>
+            <a:tileRect/>
+          </a:gradFill>
+        </p:spPr>
+        <p:txBody>
+          <a:bodyPr/>
+          <a:lstStyle/>
+          <a:p>
+            <a:pPr algn="ctr"/>
+            <a:r>
+              <a:rPr lang="en-US" dirty="0" smtClean="0"/>
+              <a:t>Database </a:t>
+            </a:r>
+            <a:r>
+              <a:rPr lang="en-US" dirty="0" err="1" smtClean="0"/>
+              <a:t>Sharding</a:t>
+            </a:r>
+            <a:endParaRPr lang="en-US" dirty="0"/>
+          </a:p>
+        </p:txBody>
+      </p:sp>
+      <p:pic>
+        <p:nvPicPr>
+          <p:cNvPr id="3" name="Picture 2"/>
+          <p:cNvPicPr>
+            <a:picLocks noChangeAspect="1"/>
+          </p:cNvPicPr>
+          <p:nvPr/>
+        </p:nvPicPr>
+        <p:blipFill>
+          <a:blip r:embed="rId2" cstate="print">
+            <a:extLst>
+              <a:ext uri="{28A0092B-C50C-407E-A947-70E740481C1C}">
+                <a14:useLocalDpi xmlns:a14="http://schemas.microsoft.com/office/drawing/2010/main" val="0"/>
+              </a:ext>
+            </a:extLst>
+          </a:blip>
+          <a:stretch>
+            <a:fillRect/>
+          </a:stretch>
+        </p:blipFill>
+        <p:spPr>
+          <a:xfrm>
+            <a:off x="2580362" y="1769047"/>
+            <a:ext cx="7031275" cy="4858044"/>
+          </a:xfrm>
+          <a:prstGeom prst="rect">
+            <a:avLst/>
+          </a:prstGeom>
+        </p:spPr>
+      </p:pic>
+    </p:spTree>
+    <p:extLst>
+      <p:ext uri="{BB962C8B-B14F-4D97-AF65-F5344CB8AC3E}">
+        <p14:creationId xmlns:p14="http://schemas.microsoft.com/office/powerpoint/2010/main" val="1961293011"/>
+      </p:ext>
+    </p:extLst>
+  </p:cSld>
+  <p:clrMapOvr>
+    <a:masterClrMapping/>
+  </p:clrMapOvr>
+</p:sld>
+</file>
+
+<file path=ppt/slides/slide22.xml><?xml version="1.0" encoding="utf-8"?>
+<p:sld xmlns:a="http://schemas.openxmlformats.org/drawingml/2006/main" xmlns:r="http://schemas.openxmlformats.org/officeDocument/2006/relationships" xmlns:p="http://schemas.openxmlformats.org/presentationml/2006/main">
+  <p:cSld>
+    <p:spTree>
+      <p:nvGrpSpPr>
+        <p:cNvPr id="1" name=""/>
+        <p:cNvGrpSpPr/>
+        <p:nvPr/>
+      </p:nvGrpSpPr>
+      <p:grpSpPr>
+        <a:xfrm>
+          <a:off x="0" y="0"/>
+          <a:ext cx="0" cy="0"/>
+          <a:chOff x="0" y="0"/>
+          <a:chExt cx="0" cy="0"/>
+        </a:xfrm>
+      </p:grpSpPr>
+      <p:sp>
+        <p:nvSpPr>
+          <p:cNvPr id="2" name="Title 1"/>
+          <p:cNvSpPr>
+            <a:spLocks noGrp="1"/>
+          </p:cNvSpPr>
+          <p:nvPr>
+            <p:ph type="title"/>
+          </p:nvPr>
+        </p:nvSpPr>
+        <p:spPr>
+          <a:gradFill flip="none" rotWithShape="1">
+            <a:gsLst>
+              <a:gs pos="0">
+                <a:schemeClr val="accent1">
+                  <a:tint val="66000"/>
+                  <a:satMod val="160000"/>
+                </a:schemeClr>
+              </a:gs>
+              <a:gs pos="50000">
+                <a:schemeClr val="accent1">
+                  <a:tint val="44500"/>
+                  <a:satMod val="160000"/>
+                </a:schemeClr>
+              </a:gs>
+              <a:gs pos="100000">
+                <a:schemeClr val="accent1">
+                  <a:tint val="23500"/>
+                  <a:satMod val="160000"/>
+                </a:schemeClr>
+              </a:gs>
+            </a:gsLst>
+            <a:lin ang="5400000" scaled="1"/>
+            <a:tileRect/>
+          </a:gradFill>
+        </p:spPr>
+        <p:txBody>
+          <a:bodyPr/>
+          <a:lstStyle/>
+          <a:p>
+            <a:pPr algn="ctr"/>
+            <a:r>
+              <a:rPr lang="en-US" dirty="0" smtClean="0"/>
+              <a:t>Database </a:t>
+            </a:r>
+            <a:r>
+              <a:rPr lang="en-US" dirty="0" err="1" smtClean="0"/>
+              <a:t>Sharding</a:t>
+            </a:r>
+            <a:endParaRPr lang="en-US" dirty="0"/>
+          </a:p>
+        </p:txBody>
+      </p:sp>
+      <p:pic>
+        <p:nvPicPr>
+          <p:cNvPr id="4" name="Picture 3"/>
+          <p:cNvPicPr>
+            <a:picLocks noChangeAspect="1"/>
+          </p:cNvPicPr>
+          <p:nvPr/>
+        </p:nvPicPr>
+        <p:blipFill>
+          <a:blip r:embed="rId2" cstate="print">
+            <a:extLst>
+              <a:ext uri="{28A0092B-C50C-407E-A947-70E740481C1C}">
+                <a14:useLocalDpi xmlns:a14="http://schemas.microsoft.com/office/drawing/2010/main" val="0"/>
+              </a:ext>
+            </a:extLst>
+          </a:blip>
+          <a:stretch>
+            <a:fillRect/>
+          </a:stretch>
+        </p:blipFill>
+        <p:spPr>
+          <a:xfrm>
+            <a:off x="4001024" y="1839185"/>
+            <a:ext cx="4189952" cy="4806378"/>
+          </a:xfrm>
+          <a:prstGeom prst="rect">
+            <a:avLst/>
+          </a:prstGeom>
+        </p:spPr>
+      </p:pic>
+    </p:spTree>
+    <p:extLst>
+      <p:ext uri="{BB962C8B-B14F-4D97-AF65-F5344CB8AC3E}">
+        <p14:creationId xmlns:p14="http://schemas.microsoft.com/office/powerpoint/2010/main" val="941699821"/>
+      </p:ext>
+    </p:extLst>
+  </p:cSld>
+  <p:clrMapOvr>
+    <a:masterClrMapping/>
+  </p:clrMapOvr>
+</p:sld>
+</file>
+
+<file path=ppt/slides/slide23.xml><?xml version="1.0" encoding="utf-8"?>
+<p:sld xmlns:a="http://schemas.openxmlformats.org/drawingml/2006/main" xmlns:r="http://schemas.openxmlformats.org/officeDocument/2006/relationships" xmlns:p="http://schemas.openxmlformats.org/presentationml/2006/main">
+  <p:cSld>
+    <p:spTree>
+      <p:nvGrpSpPr>
+        <p:cNvPr id="1" name=""/>
+        <p:cNvGrpSpPr/>
+        <p:nvPr/>
+      </p:nvGrpSpPr>
+      <p:grpSpPr>
+        <a:xfrm>
+          <a:off x="0" y="0"/>
+          <a:ext cx="0" cy="0"/>
+          <a:chOff x="0" y="0"/>
+          <a:chExt cx="0" cy="0"/>
+        </a:xfrm>
+      </p:grpSpPr>
+      <p:sp>
+        <p:nvSpPr>
+          <p:cNvPr id="2" name="Title 1"/>
+          <p:cNvSpPr>
+            <a:spLocks noGrp="1"/>
+          </p:cNvSpPr>
+          <p:nvPr>
+            <p:ph type="title"/>
+          </p:nvPr>
+        </p:nvSpPr>
+        <p:spPr>
+          <a:gradFill flip="none" rotWithShape="1">
+            <a:gsLst>
+              <a:gs pos="0">
+                <a:schemeClr val="accent1">
+                  <a:tint val="66000"/>
+                  <a:satMod val="160000"/>
+                </a:schemeClr>
+              </a:gs>
+              <a:gs pos="50000">
+                <a:schemeClr val="accent1">
+                  <a:tint val="44500"/>
+                  <a:satMod val="160000"/>
+                </a:schemeClr>
+              </a:gs>
+              <a:gs pos="100000">
+                <a:schemeClr val="accent1">
+                  <a:tint val="23500"/>
+                  <a:satMod val="160000"/>
+                </a:schemeClr>
+              </a:gs>
+            </a:gsLst>
+            <a:lin ang="5400000" scaled="1"/>
+            <a:tileRect/>
+          </a:gradFill>
+        </p:spPr>
+        <p:txBody>
+          <a:bodyPr/>
+          <a:lstStyle/>
+          <a:p>
+            <a:pPr algn="ctr"/>
+            <a:r>
+              <a:rPr lang="en-US" dirty="0" smtClean="0"/>
+              <a:t>Database </a:t>
+            </a:r>
+            <a:r>
+              <a:rPr lang="en-US" dirty="0" err="1" smtClean="0"/>
+              <a:t>Sharding</a:t>
+            </a:r>
+            <a:endParaRPr lang="en-US" dirty="0"/>
+          </a:p>
+        </p:txBody>
+      </p:sp>
+      <p:sp>
+        <p:nvSpPr>
+          <p:cNvPr id="3" name="Content Placeholder 2"/>
+          <p:cNvSpPr>
+            <a:spLocks noGrp="1"/>
+          </p:cNvSpPr>
+          <p:nvPr>
+            <p:ph idx="1"/>
+          </p:nvPr>
+        </p:nvSpPr>
+        <p:spPr/>
+        <p:txBody>
+          <a:bodyPr>
+            <a:normAutofit/>
+          </a:bodyPr>
+          <a:lstStyle/>
+          <a:p>
+            <a:pPr algn="just">
+              <a:lnSpc>
+                <a:spcPct val="150000"/>
+              </a:lnSpc>
+            </a:pPr>
+            <a:r>
+              <a:rPr lang="en-US" sz="3200" dirty="0"/>
+              <a:t>Each partition has the same schema and columns, but also entirely different rows. Likewise, the data held in </a:t>
+            </a:r>
+            <a:r>
+              <a:rPr lang="en-US" sz="3200" dirty="0" smtClean="0"/>
+              <a:t>each partition </a:t>
+            </a:r>
+            <a:r>
+              <a:rPr lang="en-US" sz="3200" dirty="0"/>
+              <a:t>is unique and independent of the data held in other partitions.</a:t>
+            </a:r>
+            <a:endParaRPr lang="en-US" sz="3200" dirty="0"/>
+          </a:p>
+        </p:txBody>
+      </p:sp>
+    </p:spTree>
+    <p:extLst>
+      <p:ext uri="{BB962C8B-B14F-4D97-AF65-F5344CB8AC3E}">
+        <p14:creationId xmlns:p14="http://schemas.microsoft.com/office/powerpoint/2010/main" val="953260635"/>
       </p:ext>
     </p:extLst>
   </p:cSld>
@@ -4420,7 +5458,6 @@
               <a:rPr lang="en-US" sz="3200" dirty="0"/>
               <a:t>applications.</a:t>
             </a:r>
-            <a:endParaRPr lang="en-US" sz="3200" dirty="0"/>
           </a:p>
         </p:txBody>
       </p:sp>

</xml_diff>

<commit_message>
Started working on the data mining presentation
</commit_message>
<xml_diff>
--- a/Advanced DBMS Presentation.pptx
+++ b/Advanced DBMS Presentation.pptx
@@ -4348,11 +4348,7 @@
             </a:r>
             <a:r>
               <a:rPr lang="en-US" sz="3200" dirty="0" smtClean="0"/>
-              <a:t>methods</a:t>
-            </a:r>
-            <a:r>
-              <a:rPr lang="en-US" sz="3200" dirty="0" smtClean="0"/>
-              <a:t>.</a:t>
+              <a:t>methods.</a:t>
             </a:r>
             <a:endParaRPr lang="en-US" sz="3200" dirty="0"/>
           </a:p>
@@ -6758,11 +6754,7 @@
             </a:r>
             <a:r>
               <a:rPr lang="en-US" sz="3200" dirty="0" smtClean="0"/>
-              <a:t> is </a:t>
-            </a:r>
-            <a:r>
-              <a:rPr lang="en-US" sz="3200" dirty="0" smtClean="0"/>
-              <a:t>fairly common, </a:t>
+              <a:t> is fairly common, </a:t>
             </a:r>
             <a:r>
               <a:rPr lang="en-US" sz="3200" dirty="0"/>

</xml_diff>